<commit_message>
Poner el orden de los comandos de Git
</commit_message>
<xml_diff>
--- a/Documentación general/Git/Presentación GitHub.pptx
+++ b/Documentación general/Git/Presentación GitHub.pptx
@@ -7,6 +7,7 @@
   <p:sldIdLst>
     <p:sldId id="256" r:id="rId2"/>
     <p:sldId id="257" r:id="rId3"/>
+    <p:sldId id="258" r:id="rId4"/>
   </p:sldIdLst>
   <p:sldSz cx="12192000" cy="6858000"/>
   <p:notesSz cx="6858000" cy="9144000"/>
@@ -111,6 +112,3754 @@
     </p:ext>
   </p:extLst>
 </p:presentation>
+</file>
+
+<file path=ppt/diagrams/colors1.xml><?xml version="1.0" encoding="utf-8"?>
+<dgm:colorsDef xmlns:dgm="http://schemas.openxmlformats.org/drawingml/2006/diagram" xmlns:a="http://schemas.openxmlformats.org/drawingml/2006/main" uniqueId="urn:microsoft.com/office/officeart/2005/8/colors/accent1_2">
+  <dgm:title val=""/>
+  <dgm:desc val=""/>
+  <dgm:catLst>
+    <dgm:cat type="accent1" pri="11200"/>
+  </dgm:catLst>
+  <dgm:styleLbl name="node0">
+    <dgm:fillClrLst meth="repeat">
+      <a:schemeClr val="accent1"/>
+    </dgm:fillClrLst>
+    <dgm:linClrLst meth="repeat">
+      <a:schemeClr val="lt1"/>
+    </dgm:linClrLst>
+    <dgm:effectClrLst/>
+    <dgm:txLinClrLst/>
+    <dgm:txFillClrLst/>
+    <dgm:txEffectClrLst/>
+  </dgm:styleLbl>
+  <dgm:styleLbl name="alignNode1">
+    <dgm:fillClrLst meth="repeat">
+      <a:schemeClr val="accent1"/>
+    </dgm:fillClrLst>
+    <dgm:linClrLst meth="repeat">
+      <a:schemeClr val="accent1"/>
+    </dgm:linClrLst>
+    <dgm:effectClrLst/>
+    <dgm:txLinClrLst/>
+    <dgm:txFillClrLst/>
+    <dgm:txEffectClrLst/>
+  </dgm:styleLbl>
+  <dgm:styleLbl name="node1">
+    <dgm:fillClrLst meth="repeat">
+      <a:schemeClr val="accent1"/>
+    </dgm:fillClrLst>
+    <dgm:linClrLst meth="repeat">
+      <a:schemeClr val="lt1"/>
+    </dgm:linClrLst>
+    <dgm:effectClrLst/>
+    <dgm:txLinClrLst/>
+    <dgm:txFillClrLst/>
+    <dgm:txEffectClrLst/>
+  </dgm:styleLbl>
+  <dgm:styleLbl name="lnNode1">
+    <dgm:fillClrLst meth="repeat">
+      <a:schemeClr val="accent1"/>
+    </dgm:fillClrLst>
+    <dgm:linClrLst meth="repeat">
+      <a:schemeClr val="lt1"/>
+    </dgm:linClrLst>
+    <dgm:effectClrLst/>
+    <dgm:txLinClrLst/>
+    <dgm:txFillClrLst/>
+    <dgm:txEffectClrLst/>
+  </dgm:styleLbl>
+  <dgm:styleLbl name="vennNode1">
+    <dgm:fillClrLst meth="repeat">
+      <a:schemeClr val="accent1">
+        <a:alpha val="50000"/>
+      </a:schemeClr>
+    </dgm:fillClrLst>
+    <dgm:linClrLst meth="repeat">
+      <a:schemeClr val="lt1"/>
+    </dgm:linClrLst>
+    <dgm:effectClrLst/>
+    <dgm:txLinClrLst/>
+    <dgm:txFillClrLst/>
+    <dgm:txEffectClrLst/>
+  </dgm:styleLbl>
+  <dgm:styleLbl name="node2">
+    <dgm:fillClrLst meth="repeat">
+      <a:schemeClr val="accent1"/>
+    </dgm:fillClrLst>
+    <dgm:linClrLst meth="repeat">
+      <a:schemeClr val="lt1"/>
+    </dgm:linClrLst>
+    <dgm:effectClrLst/>
+    <dgm:txLinClrLst/>
+    <dgm:txFillClrLst/>
+    <dgm:txEffectClrLst/>
+  </dgm:styleLbl>
+  <dgm:styleLbl name="node3">
+    <dgm:fillClrLst meth="repeat">
+      <a:schemeClr val="accent1"/>
+    </dgm:fillClrLst>
+    <dgm:linClrLst meth="repeat">
+      <a:schemeClr val="lt1"/>
+    </dgm:linClrLst>
+    <dgm:effectClrLst/>
+    <dgm:txLinClrLst/>
+    <dgm:txFillClrLst/>
+    <dgm:txEffectClrLst/>
+  </dgm:styleLbl>
+  <dgm:styleLbl name="node4">
+    <dgm:fillClrLst meth="repeat">
+      <a:schemeClr val="accent1"/>
+    </dgm:fillClrLst>
+    <dgm:linClrLst meth="repeat">
+      <a:schemeClr val="lt1"/>
+    </dgm:linClrLst>
+    <dgm:effectClrLst/>
+    <dgm:txLinClrLst/>
+    <dgm:txFillClrLst/>
+    <dgm:txEffectClrLst/>
+  </dgm:styleLbl>
+  <dgm:styleLbl name="fgImgPlace1">
+    <dgm:fillClrLst meth="repeat">
+      <a:schemeClr val="accent1">
+        <a:tint val="50000"/>
+      </a:schemeClr>
+    </dgm:fillClrLst>
+    <dgm:linClrLst meth="repeat">
+      <a:schemeClr val="lt1"/>
+    </dgm:linClrLst>
+    <dgm:effectClrLst/>
+    <dgm:txLinClrLst/>
+    <dgm:txFillClrLst meth="repeat">
+      <a:schemeClr val="lt1"/>
+    </dgm:txFillClrLst>
+    <dgm:txEffectClrLst/>
+  </dgm:styleLbl>
+  <dgm:styleLbl name="alignImgPlace1">
+    <dgm:fillClrLst meth="repeat">
+      <a:schemeClr val="accent1">
+        <a:tint val="50000"/>
+      </a:schemeClr>
+    </dgm:fillClrLst>
+    <dgm:linClrLst meth="repeat">
+      <a:schemeClr val="lt1"/>
+    </dgm:linClrLst>
+    <dgm:effectClrLst/>
+    <dgm:txLinClrLst/>
+    <dgm:txFillClrLst meth="repeat">
+      <a:schemeClr val="lt1"/>
+    </dgm:txFillClrLst>
+    <dgm:txEffectClrLst/>
+  </dgm:styleLbl>
+  <dgm:styleLbl name="bgImgPlace1">
+    <dgm:fillClrLst meth="repeat">
+      <a:schemeClr val="accent1">
+        <a:tint val="50000"/>
+      </a:schemeClr>
+    </dgm:fillClrLst>
+    <dgm:linClrLst meth="repeat">
+      <a:schemeClr val="lt1"/>
+    </dgm:linClrLst>
+    <dgm:effectClrLst/>
+    <dgm:txLinClrLst/>
+    <dgm:txFillClrLst meth="repeat">
+      <a:schemeClr val="lt1"/>
+    </dgm:txFillClrLst>
+    <dgm:txEffectClrLst/>
+  </dgm:styleLbl>
+  <dgm:styleLbl name="sibTrans2D1">
+    <dgm:fillClrLst meth="repeat">
+      <a:schemeClr val="accent1">
+        <a:tint val="60000"/>
+      </a:schemeClr>
+    </dgm:fillClrLst>
+    <dgm:linClrLst meth="repeat">
+      <a:schemeClr val="accent1">
+        <a:tint val="60000"/>
+      </a:schemeClr>
+    </dgm:linClrLst>
+    <dgm:effectClrLst/>
+    <dgm:txLinClrLst/>
+    <dgm:txFillClrLst/>
+    <dgm:txEffectClrLst/>
+  </dgm:styleLbl>
+  <dgm:styleLbl name="fgSibTrans2D1">
+    <dgm:fillClrLst meth="repeat">
+      <a:schemeClr val="accent1">
+        <a:tint val="60000"/>
+      </a:schemeClr>
+    </dgm:fillClrLst>
+    <dgm:linClrLst meth="repeat">
+      <a:schemeClr val="accent1">
+        <a:tint val="60000"/>
+      </a:schemeClr>
+    </dgm:linClrLst>
+    <dgm:effectClrLst/>
+    <dgm:txLinClrLst/>
+    <dgm:txFillClrLst/>
+    <dgm:txEffectClrLst/>
+  </dgm:styleLbl>
+  <dgm:styleLbl name="bgSibTrans2D1">
+    <dgm:fillClrLst meth="repeat">
+      <a:schemeClr val="accent1">
+        <a:tint val="60000"/>
+      </a:schemeClr>
+    </dgm:fillClrLst>
+    <dgm:linClrLst meth="repeat">
+      <a:schemeClr val="accent1">
+        <a:tint val="60000"/>
+      </a:schemeClr>
+    </dgm:linClrLst>
+    <dgm:effectClrLst/>
+    <dgm:txLinClrLst/>
+    <dgm:txFillClrLst/>
+    <dgm:txEffectClrLst/>
+  </dgm:styleLbl>
+  <dgm:styleLbl name="sibTrans1D1">
+    <dgm:fillClrLst meth="repeat">
+      <a:schemeClr val="accent1"/>
+    </dgm:fillClrLst>
+    <dgm:linClrLst meth="repeat">
+      <a:schemeClr val="accent1"/>
+    </dgm:linClrLst>
+    <dgm:effectClrLst/>
+    <dgm:txLinClrLst/>
+    <dgm:txFillClrLst meth="repeat">
+      <a:schemeClr val="tx1"/>
+    </dgm:txFillClrLst>
+    <dgm:txEffectClrLst/>
+  </dgm:styleLbl>
+  <dgm:styleLbl name="callout">
+    <dgm:fillClrLst meth="repeat">
+      <a:schemeClr val="accent1"/>
+    </dgm:fillClrLst>
+    <dgm:linClrLst meth="repeat">
+      <a:schemeClr val="accent1">
+        <a:tint val="50000"/>
+      </a:schemeClr>
+    </dgm:linClrLst>
+    <dgm:effectClrLst/>
+    <dgm:txLinClrLst/>
+    <dgm:txFillClrLst meth="repeat">
+      <a:schemeClr val="tx1"/>
+    </dgm:txFillClrLst>
+    <dgm:txEffectClrLst/>
+  </dgm:styleLbl>
+  <dgm:styleLbl name="asst0">
+    <dgm:fillClrLst meth="repeat">
+      <a:schemeClr val="accent1"/>
+    </dgm:fillClrLst>
+    <dgm:linClrLst meth="repeat">
+      <a:schemeClr val="lt1"/>
+    </dgm:linClrLst>
+    <dgm:effectClrLst/>
+    <dgm:txLinClrLst/>
+    <dgm:txFillClrLst/>
+    <dgm:txEffectClrLst/>
+  </dgm:styleLbl>
+  <dgm:styleLbl name="asst1">
+    <dgm:fillClrLst meth="repeat">
+      <a:schemeClr val="accent1"/>
+    </dgm:fillClrLst>
+    <dgm:linClrLst meth="repeat">
+      <a:schemeClr val="lt1"/>
+    </dgm:linClrLst>
+    <dgm:effectClrLst/>
+    <dgm:txLinClrLst/>
+    <dgm:txFillClrLst/>
+    <dgm:txEffectClrLst/>
+  </dgm:styleLbl>
+  <dgm:styleLbl name="asst2">
+    <dgm:fillClrLst meth="repeat">
+      <a:schemeClr val="accent1"/>
+    </dgm:fillClrLst>
+    <dgm:linClrLst meth="repeat">
+      <a:schemeClr val="lt1"/>
+    </dgm:linClrLst>
+    <dgm:effectClrLst/>
+    <dgm:txLinClrLst/>
+    <dgm:txFillClrLst/>
+    <dgm:txEffectClrLst/>
+  </dgm:styleLbl>
+  <dgm:styleLbl name="asst3">
+    <dgm:fillClrLst meth="repeat">
+      <a:schemeClr val="accent1"/>
+    </dgm:fillClrLst>
+    <dgm:linClrLst meth="repeat">
+      <a:schemeClr val="lt1"/>
+    </dgm:linClrLst>
+    <dgm:effectClrLst/>
+    <dgm:txLinClrLst/>
+    <dgm:txFillClrLst/>
+    <dgm:txEffectClrLst/>
+  </dgm:styleLbl>
+  <dgm:styleLbl name="asst4">
+    <dgm:fillClrLst meth="repeat">
+      <a:schemeClr val="accent1"/>
+    </dgm:fillClrLst>
+    <dgm:linClrLst meth="repeat">
+      <a:schemeClr val="lt1"/>
+    </dgm:linClrLst>
+    <dgm:effectClrLst/>
+    <dgm:txLinClrLst/>
+    <dgm:txFillClrLst/>
+    <dgm:txEffectClrLst/>
+  </dgm:styleLbl>
+  <dgm:styleLbl name="parChTrans2D1">
+    <dgm:fillClrLst meth="repeat">
+      <a:schemeClr val="accent1">
+        <a:tint val="60000"/>
+      </a:schemeClr>
+    </dgm:fillClrLst>
+    <dgm:linClrLst meth="repeat">
+      <a:schemeClr val="accent1">
+        <a:tint val="60000"/>
+      </a:schemeClr>
+    </dgm:linClrLst>
+    <dgm:effectClrLst/>
+    <dgm:txLinClrLst/>
+    <dgm:txFillClrLst meth="repeat">
+      <a:schemeClr val="lt1"/>
+    </dgm:txFillClrLst>
+    <dgm:txEffectClrLst/>
+  </dgm:styleLbl>
+  <dgm:styleLbl name="parChTrans2D2">
+    <dgm:fillClrLst meth="repeat">
+      <a:schemeClr val="accent1"/>
+    </dgm:fillClrLst>
+    <dgm:linClrLst meth="repeat">
+      <a:schemeClr val="accent1"/>
+    </dgm:linClrLst>
+    <dgm:effectClrLst/>
+    <dgm:txLinClrLst/>
+    <dgm:txFillClrLst meth="repeat">
+      <a:schemeClr val="lt1"/>
+    </dgm:txFillClrLst>
+    <dgm:txEffectClrLst/>
+  </dgm:styleLbl>
+  <dgm:styleLbl name="parChTrans2D3">
+    <dgm:fillClrLst meth="repeat">
+      <a:schemeClr val="accent1"/>
+    </dgm:fillClrLst>
+    <dgm:linClrLst meth="repeat">
+      <a:schemeClr val="accent1"/>
+    </dgm:linClrLst>
+    <dgm:effectClrLst/>
+    <dgm:txLinClrLst/>
+    <dgm:txFillClrLst meth="repeat">
+      <a:schemeClr val="lt1"/>
+    </dgm:txFillClrLst>
+    <dgm:txEffectClrLst/>
+  </dgm:styleLbl>
+  <dgm:styleLbl name="parChTrans2D4">
+    <dgm:fillClrLst meth="repeat">
+      <a:schemeClr val="accent1"/>
+    </dgm:fillClrLst>
+    <dgm:linClrLst meth="repeat">
+      <a:schemeClr val="accent1"/>
+    </dgm:linClrLst>
+    <dgm:effectClrLst/>
+    <dgm:txLinClrLst/>
+    <dgm:txFillClrLst meth="repeat">
+      <a:schemeClr val="lt1"/>
+    </dgm:txFillClrLst>
+    <dgm:txEffectClrLst/>
+  </dgm:styleLbl>
+  <dgm:styleLbl name="parChTrans1D1">
+    <dgm:fillClrLst meth="repeat">
+      <a:schemeClr val="accent1"/>
+    </dgm:fillClrLst>
+    <dgm:linClrLst meth="repeat">
+      <a:schemeClr val="accent1">
+        <a:shade val="60000"/>
+      </a:schemeClr>
+    </dgm:linClrLst>
+    <dgm:effectClrLst/>
+    <dgm:txLinClrLst/>
+    <dgm:txFillClrLst meth="repeat">
+      <a:schemeClr val="tx1"/>
+    </dgm:txFillClrLst>
+    <dgm:txEffectClrLst/>
+  </dgm:styleLbl>
+  <dgm:styleLbl name="parChTrans1D2">
+    <dgm:fillClrLst meth="repeat">
+      <a:schemeClr val="accent1"/>
+    </dgm:fillClrLst>
+    <dgm:linClrLst meth="repeat">
+      <a:schemeClr val="accent1">
+        <a:shade val="60000"/>
+      </a:schemeClr>
+    </dgm:linClrLst>
+    <dgm:effectClrLst/>
+    <dgm:txLinClrLst/>
+    <dgm:txFillClrLst meth="repeat">
+      <a:schemeClr val="tx1"/>
+    </dgm:txFillClrLst>
+    <dgm:txEffectClrLst/>
+  </dgm:styleLbl>
+  <dgm:styleLbl name="parChTrans1D3">
+    <dgm:fillClrLst meth="repeat">
+      <a:schemeClr val="accent1"/>
+    </dgm:fillClrLst>
+    <dgm:linClrLst meth="repeat">
+      <a:schemeClr val="accent1">
+        <a:shade val="80000"/>
+      </a:schemeClr>
+    </dgm:linClrLst>
+    <dgm:effectClrLst/>
+    <dgm:txLinClrLst/>
+    <dgm:txFillClrLst meth="repeat">
+      <a:schemeClr val="tx1"/>
+    </dgm:txFillClrLst>
+    <dgm:txEffectClrLst/>
+  </dgm:styleLbl>
+  <dgm:styleLbl name="parChTrans1D4">
+    <dgm:fillClrLst meth="repeat">
+      <a:schemeClr val="accent1"/>
+    </dgm:fillClrLst>
+    <dgm:linClrLst meth="repeat">
+      <a:schemeClr val="accent1">
+        <a:shade val="80000"/>
+      </a:schemeClr>
+    </dgm:linClrLst>
+    <dgm:effectClrLst/>
+    <dgm:txLinClrLst/>
+    <dgm:txFillClrLst meth="repeat">
+      <a:schemeClr val="tx1"/>
+    </dgm:txFillClrLst>
+    <dgm:txEffectClrLst/>
+  </dgm:styleLbl>
+  <dgm:styleLbl name="fgAcc1">
+    <dgm:fillClrLst meth="repeat">
+      <a:schemeClr val="lt1">
+        <a:alpha val="90000"/>
+      </a:schemeClr>
+    </dgm:fillClrLst>
+    <dgm:linClrLst meth="repeat">
+      <a:schemeClr val="accent1"/>
+    </dgm:linClrLst>
+    <dgm:effectClrLst/>
+    <dgm:txLinClrLst/>
+    <dgm:txFillClrLst meth="repeat">
+      <a:schemeClr val="dk1"/>
+    </dgm:txFillClrLst>
+    <dgm:txEffectClrLst/>
+  </dgm:styleLbl>
+  <dgm:styleLbl name="conFgAcc1">
+    <dgm:fillClrLst meth="repeat">
+      <a:schemeClr val="lt1">
+        <a:alpha val="90000"/>
+      </a:schemeClr>
+    </dgm:fillClrLst>
+    <dgm:linClrLst meth="repeat">
+      <a:schemeClr val="accent1"/>
+    </dgm:linClrLst>
+    <dgm:effectClrLst/>
+    <dgm:txLinClrLst/>
+    <dgm:txFillClrLst meth="repeat">
+      <a:schemeClr val="dk1"/>
+    </dgm:txFillClrLst>
+    <dgm:txEffectClrLst/>
+  </dgm:styleLbl>
+  <dgm:styleLbl name="alignAcc1">
+    <dgm:fillClrLst meth="repeat">
+      <a:schemeClr val="lt1">
+        <a:alpha val="90000"/>
+      </a:schemeClr>
+    </dgm:fillClrLst>
+    <dgm:linClrLst meth="repeat">
+      <a:schemeClr val="accent1"/>
+    </dgm:linClrLst>
+    <dgm:effectClrLst/>
+    <dgm:txLinClrLst/>
+    <dgm:txFillClrLst meth="repeat">
+      <a:schemeClr val="dk1"/>
+    </dgm:txFillClrLst>
+    <dgm:txEffectClrLst/>
+  </dgm:styleLbl>
+  <dgm:styleLbl name="trAlignAcc1">
+    <dgm:fillClrLst meth="repeat">
+      <a:schemeClr val="lt1">
+        <a:alpha val="40000"/>
+      </a:schemeClr>
+    </dgm:fillClrLst>
+    <dgm:linClrLst meth="repeat">
+      <a:schemeClr val="accent1"/>
+    </dgm:linClrLst>
+    <dgm:effectClrLst/>
+    <dgm:txLinClrLst/>
+    <dgm:txFillClrLst meth="repeat">
+      <a:schemeClr val="dk1"/>
+    </dgm:txFillClrLst>
+    <dgm:txEffectClrLst/>
+  </dgm:styleLbl>
+  <dgm:styleLbl name="bgAcc1">
+    <dgm:fillClrLst meth="repeat">
+      <a:schemeClr val="lt1">
+        <a:alpha val="90000"/>
+      </a:schemeClr>
+    </dgm:fillClrLst>
+    <dgm:linClrLst meth="repeat">
+      <a:schemeClr val="accent1"/>
+    </dgm:linClrLst>
+    <dgm:effectClrLst/>
+    <dgm:txLinClrLst/>
+    <dgm:txFillClrLst meth="repeat">
+      <a:schemeClr val="dk1"/>
+    </dgm:txFillClrLst>
+    <dgm:txEffectClrLst/>
+  </dgm:styleLbl>
+  <dgm:styleLbl name="solidFgAcc1">
+    <dgm:fillClrLst meth="repeat">
+      <a:schemeClr val="lt1"/>
+    </dgm:fillClrLst>
+    <dgm:linClrLst meth="repeat">
+      <a:schemeClr val="accent1"/>
+    </dgm:linClrLst>
+    <dgm:effectClrLst/>
+    <dgm:txLinClrLst/>
+    <dgm:txFillClrLst meth="repeat">
+      <a:schemeClr val="dk1"/>
+    </dgm:txFillClrLst>
+    <dgm:txEffectClrLst/>
+  </dgm:styleLbl>
+  <dgm:styleLbl name="solidAlignAcc1">
+    <dgm:fillClrLst meth="repeat">
+      <a:schemeClr val="lt1"/>
+    </dgm:fillClrLst>
+    <dgm:linClrLst meth="repeat">
+      <a:schemeClr val="accent1"/>
+    </dgm:linClrLst>
+    <dgm:effectClrLst/>
+    <dgm:txLinClrLst/>
+    <dgm:txFillClrLst meth="repeat">
+      <a:schemeClr val="dk1"/>
+    </dgm:txFillClrLst>
+    <dgm:txEffectClrLst/>
+  </dgm:styleLbl>
+  <dgm:styleLbl name="solidBgAcc1">
+    <dgm:fillClrLst meth="repeat">
+      <a:schemeClr val="lt1"/>
+    </dgm:fillClrLst>
+    <dgm:linClrLst meth="repeat">
+      <a:schemeClr val="accent1"/>
+    </dgm:linClrLst>
+    <dgm:effectClrLst/>
+    <dgm:txLinClrLst/>
+    <dgm:txFillClrLst meth="repeat">
+      <a:schemeClr val="dk1"/>
+    </dgm:txFillClrLst>
+    <dgm:txEffectClrLst/>
+  </dgm:styleLbl>
+  <dgm:styleLbl name="fgAccFollowNode1">
+    <dgm:fillClrLst meth="repeat">
+      <a:schemeClr val="accent1">
+        <a:alpha val="90000"/>
+        <a:tint val="40000"/>
+      </a:schemeClr>
+    </dgm:fillClrLst>
+    <dgm:linClrLst meth="repeat">
+      <a:schemeClr val="accent1">
+        <a:alpha val="90000"/>
+        <a:tint val="40000"/>
+      </a:schemeClr>
+    </dgm:linClrLst>
+    <dgm:effectClrLst/>
+    <dgm:txLinClrLst/>
+    <dgm:txFillClrLst meth="repeat">
+      <a:schemeClr val="dk1"/>
+    </dgm:txFillClrLst>
+    <dgm:txEffectClrLst/>
+  </dgm:styleLbl>
+  <dgm:styleLbl name="alignAccFollowNode1">
+    <dgm:fillClrLst meth="repeat">
+      <a:schemeClr val="accent1">
+        <a:alpha val="90000"/>
+        <a:tint val="40000"/>
+      </a:schemeClr>
+    </dgm:fillClrLst>
+    <dgm:linClrLst meth="repeat">
+      <a:schemeClr val="accent1">
+        <a:alpha val="90000"/>
+        <a:tint val="40000"/>
+      </a:schemeClr>
+    </dgm:linClrLst>
+    <dgm:effectClrLst/>
+    <dgm:txLinClrLst/>
+    <dgm:txFillClrLst meth="repeat">
+      <a:schemeClr val="dk1"/>
+    </dgm:txFillClrLst>
+    <dgm:txEffectClrLst/>
+  </dgm:styleLbl>
+  <dgm:styleLbl name="bgAccFollowNode1">
+    <dgm:fillClrLst meth="repeat">
+      <a:schemeClr val="accent1">
+        <a:alpha val="90000"/>
+        <a:tint val="40000"/>
+      </a:schemeClr>
+    </dgm:fillClrLst>
+    <dgm:linClrLst meth="repeat">
+      <a:schemeClr val="accent1">
+        <a:alpha val="90000"/>
+        <a:tint val="40000"/>
+      </a:schemeClr>
+    </dgm:linClrLst>
+    <dgm:effectClrLst/>
+    <dgm:txLinClrLst/>
+    <dgm:txFillClrLst meth="repeat">
+      <a:schemeClr val="dk1"/>
+    </dgm:txFillClrLst>
+    <dgm:txEffectClrLst/>
+  </dgm:styleLbl>
+  <dgm:styleLbl name="fgAcc0">
+    <dgm:fillClrLst meth="repeat">
+      <a:schemeClr val="lt1">
+        <a:alpha val="90000"/>
+      </a:schemeClr>
+    </dgm:fillClrLst>
+    <dgm:linClrLst meth="repeat">
+      <a:schemeClr val="accent1"/>
+    </dgm:linClrLst>
+    <dgm:effectClrLst/>
+    <dgm:txLinClrLst/>
+    <dgm:txFillClrLst meth="repeat">
+      <a:schemeClr val="dk1"/>
+    </dgm:txFillClrLst>
+    <dgm:txEffectClrLst/>
+  </dgm:styleLbl>
+  <dgm:styleLbl name="fgAcc2">
+    <dgm:fillClrLst meth="repeat">
+      <a:schemeClr val="lt1">
+        <a:alpha val="90000"/>
+      </a:schemeClr>
+    </dgm:fillClrLst>
+    <dgm:linClrLst meth="repeat">
+      <a:schemeClr val="accent1"/>
+    </dgm:linClrLst>
+    <dgm:effectClrLst/>
+    <dgm:txLinClrLst/>
+    <dgm:txFillClrLst meth="repeat">
+      <a:schemeClr val="dk1"/>
+    </dgm:txFillClrLst>
+    <dgm:txEffectClrLst/>
+  </dgm:styleLbl>
+  <dgm:styleLbl name="fgAcc3">
+    <dgm:fillClrLst meth="repeat">
+      <a:schemeClr val="lt1">
+        <a:alpha val="90000"/>
+      </a:schemeClr>
+    </dgm:fillClrLst>
+    <dgm:linClrLst meth="repeat">
+      <a:schemeClr val="accent1"/>
+    </dgm:linClrLst>
+    <dgm:effectClrLst/>
+    <dgm:txLinClrLst/>
+    <dgm:txFillClrLst meth="repeat">
+      <a:schemeClr val="dk1"/>
+    </dgm:txFillClrLst>
+    <dgm:txEffectClrLst/>
+  </dgm:styleLbl>
+  <dgm:styleLbl name="fgAcc4">
+    <dgm:fillClrLst meth="repeat">
+      <a:schemeClr val="lt1">
+        <a:alpha val="90000"/>
+      </a:schemeClr>
+    </dgm:fillClrLst>
+    <dgm:linClrLst meth="repeat">
+      <a:schemeClr val="accent1"/>
+    </dgm:linClrLst>
+    <dgm:effectClrLst/>
+    <dgm:txLinClrLst/>
+    <dgm:txFillClrLst meth="repeat">
+      <a:schemeClr val="dk1"/>
+    </dgm:txFillClrLst>
+    <dgm:txEffectClrLst/>
+  </dgm:styleLbl>
+  <dgm:styleLbl name="bgShp">
+    <dgm:fillClrLst meth="repeat">
+      <a:schemeClr val="accent1">
+        <a:tint val="40000"/>
+      </a:schemeClr>
+    </dgm:fillClrLst>
+    <dgm:linClrLst meth="repeat">
+      <a:schemeClr val="accent1"/>
+    </dgm:linClrLst>
+    <dgm:effectClrLst/>
+    <dgm:txLinClrLst/>
+    <dgm:txFillClrLst meth="repeat">
+      <a:schemeClr val="dk1"/>
+    </dgm:txFillClrLst>
+    <dgm:txEffectClrLst/>
+  </dgm:styleLbl>
+  <dgm:styleLbl name="dkBgShp">
+    <dgm:fillClrLst meth="repeat">
+      <a:schemeClr val="accent1">
+        <a:shade val="80000"/>
+      </a:schemeClr>
+    </dgm:fillClrLst>
+    <dgm:linClrLst meth="repeat">
+      <a:schemeClr val="accent1"/>
+    </dgm:linClrLst>
+    <dgm:effectClrLst/>
+    <dgm:txLinClrLst/>
+    <dgm:txFillClrLst meth="repeat">
+      <a:schemeClr val="lt1"/>
+    </dgm:txFillClrLst>
+    <dgm:txEffectClrLst/>
+  </dgm:styleLbl>
+  <dgm:styleLbl name="trBgShp">
+    <dgm:fillClrLst meth="repeat">
+      <a:schemeClr val="accent1">
+        <a:tint val="50000"/>
+        <a:alpha val="40000"/>
+      </a:schemeClr>
+    </dgm:fillClrLst>
+    <dgm:linClrLst meth="repeat">
+      <a:schemeClr val="accent1"/>
+    </dgm:linClrLst>
+    <dgm:effectClrLst/>
+    <dgm:txLinClrLst/>
+    <dgm:txFillClrLst meth="repeat">
+      <a:schemeClr val="lt1"/>
+    </dgm:txFillClrLst>
+    <dgm:txEffectClrLst/>
+  </dgm:styleLbl>
+  <dgm:styleLbl name="fgShp">
+    <dgm:fillClrLst meth="repeat">
+      <a:schemeClr val="accent1">
+        <a:tint val="60000"/>
+      </a:schemeClr>
+    </dgm:fillClrLst>
+    <dgm:linClrLst meth="repeat">
+      <a:schemeClr val="lt1"/>
+    </dgm:linClrLst>
+    <dgm:effectClrLst/>
+    <dgm:txLinClrLst/>
+    <dgm:txFillClrLst meth="repeat">
+      <a:schemeClr val="dk1"/>
+    </dgm:txFillClrLst>
+    <dgm:txEffectClrLst/>
+  </dgm:styleLbl>
+  <dgm:styleLbl name="revTx">
+    <dgm:fillClrLst meth="repeat">
+      <a:schemeClr val="lt1">
+        <a:alpha val="0"/>
+      </a:schemeClr>
+    </dgm:fillClrLst>
+    <dgm:linClrLst meth="repeat">
+      <a:schemeClr val="dk1">
+        <a:alpha val="0"/>
+      </a:schemeClr>
+    </dgm:linClrLst>
+    <dgm:effectClrLst/>
+    <dgm:txLinClrLst/>
+    <dgm:txFillClrLst meth="repeat">
+      <a:schemeClr val="tx1"/>
+    </dgm:txFillClrLst>
+    <dgm:txEffectClrLst/>
+  </dgm:styleLbl>
+</dgm:colorsDef>
+</file>
+
+<file path=ppt/diagrams/data1.xml><?xml version="1.0" encoding="utf-8"?>
+<dgm:dataModel xmlns:dgm="http://schemas.openxmlformats.org/drawingml/2006/diagram" xmlns:a="http://schemas.openxmlformats.org/drawingml/2006/main">
+  <dgm:ptLst>
+    <dgm:pt modelId="{E656005C-A54B-4D69-82F6-B752790BCB3A}" type="doc">
+      <dgm:prSet loTypeId="urn:microsoft.com/office/officeart/2005/8/layout/cycle5" loCatId="cycle" qsTypeId="urn:microsoft.com/office/officeart/2005/8/quickstyle/3d2" qsCatId="3D" csTypeId="urn:microsoft.com/office/officeart/2005/8/colors/accent1_2" csCatId="accent1" phldr="1"/>
+      <dgm:spPr/>
+      <dgm:t>
+        <a:bodyPr/>
+        <a:lstStyle/>
+        <a:p>
+          <a:endParaRPr lang="es-MX"/>
+        </a:p>
+      </dgm:t>
+    </dgm:pt>
+    <dgm:pt modelId="{1AE6AC5D-41C3-4345-80DA-562E9AFCD6B2}">
+      <dgm:prSet phldrT="[Texto]" custT="1"/>
+      <dgm:spPr/>
+      <dgm:t>
+        <a:bodyPr/>
+        <a:lstStyle/>
+        <a:p>
+          <a:pPr algn="ctr"/>
+          <a:r>
+            <a:rPr lang="es-MX" sz="2400" dirty="0"/>
+            <a:t>Crear rama</a:t>
+          </a:r>
+        </a:p>
+      </dgm:t>
+    </dgm:pt>
+    <dgm:pt modelId="{573FA441-9BD7-4155-8856-DF08193E077D}" type="parTrans" cxnId="{BD712732-A796-426F-A54E-F9E79719C0B6}">
+      <dgm:prSet/>
+      <dgm:spPr/>
+      <dgm:t>
+        <a:bodyPr/>
+        <a:lstStyle/>
+        <a:p>
+          <a:endParaRPr lang="es-MX"/>
+        </a:p>
+      </dgm:t>
+    </dgm:pt>
+    <dgm:pt modelId="{C1D9201C-2AB1-4DE4-8A73-3241B5DA17F5}" type="sibTrans" cxnId="{BD712732-A796-426F-A54E-F9E79719C0B6}">
+      <dgm:prSet/>
+      <dgm:spPr/>
+      <dgm:t>
+        <a:bodyPr/>
+        <a:lstStyle/>
+        <a:p>
+          <a:endParaRPr lang="es-MX"/>
+        </a:p>
+      </dgm:t>
+    </dgm:pt>
+    <dgm:pt modelId="{D13FCB60-EECF-4F9A-A43D-3DA74B79D49A}">
+      <dgm:prSet phldrT="[Texto]" custT="1"/>
+      <dgm:spPr/>
+      <dgm:t>
+        <a:bodyPr/>
+        <a:lstStyle/>
+        <a:p>
+          <a:pPr algn="ctr"/>
+          <a:r>
+            <a:rPr lang="es-MX" sz="2400" dirty="0"/>
+            <a:t>Trabajo</a:t>
+          </a:r>
+        </a:p>
+      </dgm:t>
+    </dgm:pt>
+    <dgm:pt modelId="{552C49FE-CC38-4211-A03D-7D87EE6C2D48}" type="parTrans" cxnId="{E5A9DD38-8F4B-48B2-AA0A-096421481BFE}">
+      <dgm:prSet/>
+      <dgm:spPr/>
+      <dgm:t>
+        <a:bodyPr/>
+        <a:lstStyle/>
+        <a:p>
+          <a:endParaRPr lang="es-MX"/>
+        </a:p>
+      </dgm:t>
+    </dgm:pt>
+    <dgm:pt modelId="{80679AAE-4DE8-44EC-A913-2FA3D7083AE7}" type="sibTrans" cxnId="{E5A9DD38-8F4B-48B2-AA0A-096421481BFE}">
+      <dgm:prSet/>
+      <dgm:spPr/>
+      <dgm:t>
+        <a:bodyPr/>
+        <a:lstStyle/>
+        <a:p>
+          <a:endParaRPr lang="es-MX"/>
+        </a:p>
+      </dgm:t>
+    </dgm:pt>
+    <dgm:pt modelId="{3632C226-D928-455A-94A7-F6A9036A4F66}">
+      <dgm:prSet phldrT="[Texto]"/>
+      <dgm:spPr/>
+      <dgm:t>
+        <a:bodyPr/>
+        <a:lstStyle/>
+        <a:p>
+          <a:pPr algn="ctr"/>
+          <a:r>
+            <a:rPr lang="es-MX" dirty="0"/>
+            <a:t>Merge</a:t>
+          </a:r>
+        </a:p>
+      </dgm:t>
+    </dgm:pt>
+    <dgm:pt modelId="{093DAAD6-E889-4358-831F-173BED595128}" type="parTrans" cxnId="{D984A074-6F89-4260-86FC-FB617D911B99}">
+      <dgm:prSet/>
+      <dgm:spPr/>
+      <dgm:t>
+        <a:bodyPr/>
+        <a:lstStyle/>
+        <a:p>
+          <a:endParaRPr lang="es-MX"/>
+        </a:p>
+      </dgm:t>
+    </dgm:pt>
+    <dgm:pt modelId="{25CF1AC2-03B7-4281-A6A0-4C13FB2B01D8}" type="sibTrans" cxnId="{D984A074-6F89-4260-86FC-FB617D911B99}">
+      <dgm:prSet/>
+      <dgm:spPr/>
+      <dgm:t>
+        <a:bodyPr/>
+        <a:lstStyle/>
+        <a:p>
+          <a:endParaRPr lang="es-MX"/>
+        </a:p>
+      </dgm:t>
+    </dgm:pt>
+    <dgm:pt modelId="{A5D2CFB7-0BE2-4C62-A6C9-7A62562F1C98}">
+      <dgm:prSet phldrT="[Texto]" custT="1"/>
+      <dgm:spPr/>
+      <dgm:t>
+        <a:bodyPr/>
+        <a:lstStyle/>
+        <a:p>
+          <a:pPr algn="l"/>
+          <a:r>
+            <a:rPr lang="es-MX" sz="1800" dirty="0"/>
+            <a:t>git pull</a:t>
+          </a:r>
+        </a:p>
+      </dgm:t>
+    </dgm:pt>
+    <dgm:pt modelId="{6F12079D-0A38-4660-B65F-C29AAFB006F3}" type="parTrans" cxnId="{5741BB82-8EB5-495A-8138-FE0BF1EFD635}">
+      <dgm:prSet/>
+      <dgm:spPr/>
+      <dgm:t>
+        <a:bodyPr/>
+        <a:lstStyle/>
+        <a:p>
+          <a:endParaRPr lang="es-MX"/>
+        </a:p>
+      </dgm:t>
+    </dgm:pt>
+    <dgm:pt modelId="{7958D468-A3CB-41DC-B9C9-5E1D69A42666}" type="sibTrans" cxnId="{5741BB82-8EB5-495A-8138-FE0BF1EFD635}">
+      <dgm:prSet/>
+      <dgm:spPr/>
+      <dgm:t>
+        <a:bodyPr/>
+        <a:lstStyle/>
+        <a:p>
+          <a:endParaRPr lang="es-MX"/>
+        </a:p>
+      </dgm:t>
+    </dgm:pt>
+    <dgm:pt modelId="{B359D2F3-12FA-49F7-BC18-C0E97F4BCE58}">
+      <dgm:prSet phldrT="[Texto]" custT="1"/>
+      <dgm:spPr/>
+      <dgm:t>
+        <a:bodyPr/>
+        <a:lstStyle/>
+        <a:p>
+          <a:pPr algn="l"/>
+          <a:r>
+            <a:rPr lang="es-MX" sz="1800" dirty="0"/>
+            <a:t>git checkout –b “nombreRama”</a:t>
+          </a:r>
+        </a:p>
+      </dgm:t>
+    </dgm:pt>
+    <dgm:pt modelId="{F2E23D58-66B3-4B08-8E70-E121A2EEA76E}" type="parTrans" cxnId="{3F399791-5E6B-4891-ABC2-F023B670673A}">
+      <dgm:prSet/>
+      <dgm:spPr/>
+      <dgm:t>
+        <a:bodyPr/>
+        <a:lstStyle/>
+        <a:p>
+          <a:endParaRPr lang="es-MX"/>
+        </a:p>
+      </dgm:t>
+    </dgm:pt>
+    <dgm:pt modelId="{8AFB3107-52B0-4F50-B939-747297CF2519}" type="sibTrans" cxnId="{3F399791-5E6B-4891-ABC2-F023B670673A}">
+      <dgm:prSet/>
+      <dgm:spPr/>
+      <dgm:t>
+        <a:bodyPr/>
+        <a:lstStyle/>
+        <a:p>
+          <a:endParaRPr lang="es-MX"/>
+        </a:p>
+      </dgm:t>
+    </dgm:pt>
+    <dgm:pt modelId="{0369B0CA-E818-4571-9CEF-E89D2DBF9076}">
+      <dgm:prSet phldrT="[Texto]" custT="1"/>
+      <dgm:spPr/>
+      <dgm:t>
+        <a:bodyPr/>
+        <a:lstStyle/>
+        <a:p>
+          <a:pPr algn="l"/>
+          <a:r>
+            <a:rPr lang="es-MX" sz="1800" dirty="0"/>
+            <a:t>git add –A</a:t>
+          </a:r>
+        </a:p>
+      </dgm:t>
+    </dgm:pt>
+    <dgm:pt modelId="{E5DAE76C-897F-42F8-BEC9-711986F5AD7D}" type="parTrans" cxnId="{54C26960-FBCD-4D19-A58B-B83F9865E6E5}">
+      <dgm:prSet/>
+      <dgm:spPr/>
+      <dgm:t>
+        <a:bodyPr/>
+        <a:lstStyle/>
+        <a:p>
+          <a:endParaRPr lang="es-MX"/>
+        </a:p>
+      </dgm:t>
+    </dgm:pt>
+    <dgm:pt modelId="{3E79B4BB-B765-4222-8052-9EF288372F90}" type="sibTrans" cxnId="{54C26960-FBCD-4D19-A58B-B83F9865E6E5}">
+      <dgm:prSet/>
+      <dgm:spPr/>
+      <dgm:t>
+        <a:bodyPr/>
+        <a:lstStyle/>
+        <a:p>
+          <a:endParaRPr lang="es-MX"/>
+        </a:p>
+      </dgm:t>
+    </dgm:pt>
+    <dgm:pt modelId="{62CF9BB1-C850-4B3F-A56A-E1BE4BABE2E6}">
+      <dgm:prSet phldrT="[Texto]" custT="1"/>
+      <dgm:spPr/>
+      <dgm:t>
+        <a:bodyPr/>
+        <a:lstStyle/>
+        <a:p>
+          <a:pPr algn="l"/>
+          <a:r>
+            <a:rPr lang="es-MX" sz="1800" dirty="0"/>
+            <a:t>git commit –m “mensaje”</a:t>
+          </a:r>
+        </a:p>
+      </dgm:t>
+    </dgm:pt>
+    <dgm:pt modelId="{D40F20CD-78CE-4300-A0E2-01CD788E6E5E}" type="parTrans" cxnId="{30C9C67E-FD02-437F-9BDF-49FFDF24B102}">
+      <dgm:prSet/>
+      <dgm:spPr/>
+      <dgm:t>
+        <a:bodyPr/>
+        <a:lstStyle/>
+        <a:p>
+          <a:endParaRPr lang="es-MX"/>
+        </a:p>
+      </dgm:t>
+    </dgm:pt>
+    <dgm:pt modelId="{FD63647A-4E56-46E2-8F14-79E384331C98}" type="sibTrans" cxnId="{30C9C67E-FD02-437F-9BDF-49FFDF24B102}">
+      <dgm:prSet/>
+      <dgm:spPr/>
+      <dgm:t>
+        <a:bodyPr/>
+        <a:lstStyle/>
+        <a:p>
+          <a:endParaRPr lang="es-MX"/>
+        </a:p>
+      </dgm:t>
+    </dgm:pt>
+    <dgm:pt modelId="{49DD2E3B-D534-40DC-B4EC-977916C7E15C}">
+      <dgm:prSet phldrT="[Texto]" custT="1"/>
+      <dgm:spPr/>
+      <dgm:t>
+        <a:bodyPr/>
+        <a:lstStyle/>
+        <a:p>
+          <a:pPr algn="l"/>
+          <a:r>
+            <a:rPr lang="es-MX" sz="1800" dirty="0"/>
+            <a:t>git add –A</a:t>
+          </a:r>
+        </a:p>
+      </dgm:t>
+    </dgm:pt>
+    <dgm:pt modelId="{C9ABF05C-39D4-400D-B5A3-E4C9C38275D4}" type="parTrans" cxnId="{31D1DA18-8FF6-4B06-8CBF-8CE03A8D8BC9}">
+      <dgm:prSet/>
+      <dgm:spPr/>
+      <dgm:t>
+        <a:bodyPr/>
+        <a:lstStyle/>
+        <a:p>
+          <a:endParaRPr lang="es-MX"/>
+        </a:p>
+      </dgm:t>
+    </dgm:pt>
+    <dgm:pt modelId="{BEB05271-45E6-4F0E-83A2-A0D9BA100682}" type="sibTrans" cxnId="{31D1DA18-8FF6-4B06-8CBF-8CE03A8D8BC9}">
+      <dgm:prSet/>
+      <dgm:spPr/>
+      <dgm:t>
+        <a:bodyPr/>
+        <a:lstStyle/>
+        <a:p>
+          <a:endParaRPr lang="es-MX"/>
+        </a:p>
+      </dgm:t>
+    </dgm:pt>
+    <dgm:pt modelId="{A2155F2E-D190-4D0F-884C-A00B4DF6E57D}">
+      <dgm:prSet phldrT="[Texto]" custT="1"/>
+      <dgm:spPr/>
+      <dgm:t>
+        <a:bodyPr/>
+        <a:lstStyle/>
+        <a:p>
+          <a:pPr algn="l"/>
+          <a:r>
+            <a:rPr lang="es-MX" sz="1800" dirty="0"/>
+            <a:t>git commit –m “mensaje”</a:t>
+          </a:r>
+        </a:p>
+      </dgm:t>
+    </dgm:pt>
+    <dgm:pt modelId="{FC8543A4-4633-42B6-A5F1-1A7078AE613B}" type="parTrans" cxnId="{28817A2E-0CA0-47A8-A816-EDC1D8B3D37B}">
+      <dgm:prSet/>
+      <dgm:spPr/>
+      <dgm:t>
+        <a:bodyPr/>
+        <a:lstStyle/>
+        <a:p>
+          <a:endParaRPr lang="es-MX"/>
+        </a:p>
+      </dgm:t>
+    </dgm:pt>
+    <dgm:pt modelId="{3B256354-0411-48BB-A4E9-23A602B34FC4}" type="sibTrans" cxnId="{28817A2E-0CA0-47A8-A816-EDC1D8B3D37B}">
+      <dgm:prSet/>
+      <dgm:spPr/>
+      <dgm:t>
+        <a:bodyPr/>
+        <a:lstStyle/>
+        <a:p>
+          <a:endParaRPr lang="es-MX"/>
+        </a:p>
+      </dgm:t>
+    </dgm:pt>
+    <dgm:pt modelId="{BC2D9DCE-5929-4A6B-9F03-BCF92683C1D0}">
+      <dgm:prSet phldrT="[Texto]" custT="1"/>
+      <dgm:spPr/>
+      <dgm:t>
+        <a:bodyPr/>
+        <a:lstStyle/>
+        <a:p>
+          <a:pPr algn="l"/>
+          <a:r>
+            <a:rPr lang="es-MX" sz="1800" dirty="0"/>
+            <a:t>git pull</a:t>
+          </a:r>
+        </a:p>
+      </dgm:t>
+    </dgm:pt>
+    <dgm:pt modelId="{6ADE0E61-6BC5-4A35-AE10-4FD55ED26D55}" type="parTrans" cxnId="{5FABFDDF-FB31-45AC-A180-CDE644573C5A}">
+      <dgm:prSet/>
+      <dgm:spPr/>
+      <dgm:t>
+        <a:bodyPr/>
+        <a:lstStyle/>
+        <a:p>
+          <a:endParaRPr lang="es-MX"/>
+        </a:p>
+      </dgm:t>
+    </dgm:pt>
+    <dgm:pt modelId="{40800D22-FE73-4F8F-8B01-ED2E46F0C321}" type="sibTrans" cxnId="{5FABFDDF-FB31-45AC-A180-CDE644573C5A}">
+      <dgm:prSet/>
+      <dgm:spPr/>
+      <dgm:t>
+        <a:bodyPr/>
+        <a:lstStyle/>
+        <a:p>
+          <a:endParaRPr lang="es-MX"/>
+        </a:p>
+      </dgm:t>
+    </dgm:pt>
+    <dgm:pt modelId="{8268AAB3-188F-4432-8BE3-166398EFD77A}">
+      <dgm:prSet phldrT="[Texto]" custT="1"/>
+      <dgm:spPr/>
+      <dgm:t>
+        <a:bodyPr/>
+        <a:lstStyle/>
+        <a:p>
+          <a:pPr algn="l"/>
+          <a:r>
+            <a:rPr lang="es-MX" sz="1800" dirty="0"/>
+            <a:t>git push</a:t>
+          </a:r>
+        </a:p>
+      </dgm:t>
+    </dgm:pt>
+    <dgm:pt modelId="{FC5BFAE0-55A3-4734-A166-03CA4C9807BE}" type="parTrans" cxnId="{BD217B2A-0006-487E-BE18-06CF40327219}">
+      <dgm:prSet/>
+      <dgm:spPr/>
+      <dgm:t>
+        <a:bodyPr/>
+        <a:lstStyle/>
+        <a:p>
+          <a:endParaRPr lang="es-MX"/>
+        </a:p>
+      </dgm:t>
+    </dgm:pt>
+    <dgm:pt modelId="{107246ED-E344-4D2B-863D-5E85465ABBD4}" type="sibTrans" cxnId="{BD217B2A-0006-487E-BE18-06CF40327219}">
+      <dgm:prSet/>
+      <dgm:spPr/>
+      <dgm:t>
+        <a:bodyPr/>
+        <a:lstStyle/>
+        <a:p>
+          <a:endParaRPr lang="es-MX"/>
+        </a:p>
+      </dgm:t>
+    </dgm:pt>
+    <dgm:pt modelId="{EA7AE219-2DD3-41E1-94F6-DD2A7A762ADA}">
+      <dgm:prSet phldrT="[Texto]" custT="1"/>
+      <dgm:spPr/>
+      <dgm:t>
+        <a:bodyPr/>
+        <a:lstStyle/>
+        <a:p>
+          <a:pPr algn="l"/>
+          <a:r>
+            <a:rPr lang="es-MX" sz="1800" dirty="0"/>
+            <a:t>…</a:t>
+          </a:r>
+        </a:p>
+      </dgm:t>
+    </dgm:pt>
+    <dgm:pt modelId="{63D85AFB-F8DA-48FD-81EC-C3E8767C14D9}" type="parTrans" cxnId="{5806E1C5-E80E-47FC-B697-4A9DE27FAE11}">
+      <dgm:prSet/>
+      <dgm:spPr/>
+      <dgm:t>
+        <a:bodyPr/>
+        <a:lstStyle/>
+        <a:p>
+          <a:endParaRPr lang="es-MX"/>
+        </a:p>
+      </dgm:t>
+    </dgm:pt>
+    <dgm:pt modelId="{26750CF5-8EC0-4D63-BA34-61A13206E45C}" type="sibTrans" cxnId="{5806E1C5-E80E-47FC-B697-4A9DE27FAE11}">
+      <dgm:prSet/>
+      <dgm:spPr/>
+      <dgm:t>
+        <a:bodyPr/>
+        <a:lstStyle/>
+        <a:p>
+          <a:endParaRPr lang="es-MX"/>
+        </a:p>
+      </dgm:t>
+    </dgm:pt>
+    <dgm:pt modelId="{EAB4E03F-F607-41CF-AC59-065092F81F95}">
+      <dgm:prSet phldrT="[Texto]"/>
+      <dgm:spPr/>
+      <dgm:t>
+        <a:bodyPr/>
+        <a:lstStyle/>
+        <a:p>
+          <a:pPr algn="l"/>
+          <a:r>
+            <a:rPr lang="es-MX" dirty="0"/>
+            <a:t>git checkout develop</a:t>
+          </a:r>
+        </a:p>
+      </dgm:t>
+    </dgm:pt>
+    <dgm:pt modelId="{38E2F187-C7FD-42A8-BE50-B36A5A69377D}" type="parTrans" cxnId="{881D8B42-111C-46C6-9505-C3F2188DA3D4}">
+      <dgm:prSet/>
+      <dgm:spPr/>
+      <dgm:t>
+        <a:bodyPr/>
+        <a:lstStyle/>
+        <a:p>
+          <a:endParaRPr lang="es-MX"/>
+        </a:p>
+      </dgm:t>
+    </dgm:pt>
+    <dgm:pt modelId="{11806555-EA0E-4856-82E9-9AA5FA6B6E69}" type="sibTrans" cxnId="{881D8B42-111C-46C6-9505-C3F2188DA3D4}">
+      <dgm:prSet/>
+      <dgm:spPr/>
+      <dgm:t>
+        <a:bodyPr/>
+        <a:lstStyle/>
+        <a:p>
+          <a:endParaRPr lang="es-MX"/>
+        </a:p>
+      </dgm:t>
+    </dgm:pt>
+    <dgm:pt modelId="{B9E9B89B-95CE-497D-93E9-21AC24B43762}">
+      <dgm:prSet phldrT="[Texto]"/>
+      <dgm:spPr/>
+      <dgm:t>
+        <a:bodyPr/>
+        <a:lstStyle/>
+        <a:p>
+          <a:pPr algn="l"/>
+          <a:r>
+            <a:rPr lang="es-MX" dirty="0"/>
+            <a:t>git pull</a:t>
+          </a:r>
+        </a:p>
+      </dgm:t>
+    </dgm:pt>
+    <dgm:pt modelId="{1F344831-2054-4AE6-A910-2D1EB1718503}" type="parTrans" cxnId="{FF08E047-CF0C-4EEC-BD40-1435875BEACD}">
+      <dgm:prSet/>
+      <dgm:spPr/>
+      <dgm:t>
+        <a:bodyPr/>
+        <a:lstStyle/>
+        <a:p>
+          <a:endParaRPr lang="es-MX"/>
+        </a:p>
+      </dgm:t>
+    </dgm:pt>
+    <dgm:pt modelId="{EFA0C1E8-A500-43B3-87E1-0D5E7A4BFF76}" type="sibTrans" cxnId="{FF08E047-CF0C-4EEC-BD40-1435875BEACD}">
+      <dgm:prSet/>
+      <dgm:spPr/>
+      <dgm:t>
+        <a:bodyPr/>
+        <a:lstStyle/>
+        <a:p>
+          <a:endParaRPr lang="es-MX"/>
+        </a:p>
+      </dgm:t>
+    </dgm:pt>
+    <dgm:pt modelId="{F2257F09-2DA7-406F-92D5-9D5BC3BCDF63}">
+      <dgm:prSet phldrT="[Texto]"/>
+      <dgm:spPr/>
+      <dgm:t>
+        <a:bodyPr/>
+        <a:lstStyle/>
+        <a:p>
+          <a:pPr algn="l"/>
+          <a:r>
+            <a:rPr lang="es-MX" dirty="0"/>
+            <a:t>git merge “ramaOrigen”</a:t>
+          </a:r>
+        </a:p>
+      </dgm:t>
+    </dgm:pt>
+    <dgm:pt modelId="{CE2FB192-0176-48CB-A53D-74E60F1ABE9C}" type="parTrans" cxnId="{A37FE0CD-2464-46A8-B326-7EDEB0A4B252}">
+      <dgm:prSet/>
+      <dgm:spPr/>
+      <dgm:t>
+        <a:bodyPr/>
+        <a:lstStyle/>
+        <a:p>
+          <a:endParaRPr lang="es-MX"/>
+        </a:p>
+      </dgm:t>
+    </dgm:pt>
+    <dgm:pt modelId="{DD300A03-B1B2-4701-8288-0908E3879803}" type="sibTrans" cxnId="{A37FE0CD-2464-46A8-B326-7EDEB0A4B252}">
+      <dgm:prSet/>
+      <dgm:spPr/>
+      <dgm:t>
+        <a:bodyPr/>
+        <a:lstStyle/>
+        <a:p>
+          <a:endParaRPr lang="es-MX"/>
+        </a:p>
+      </dgm:t>
+    </dgm:pt>
+    <dgm:pt modelId="{C548FDC1-91AD-4EE2-8C44-58015CBDCAD1}">
+      <dgm:prSet phldrT="[Texto]"/>
+      <dgm:spPr/>
+      <dgm:t>
+        <a:bodyPr/>
+        <a:lstStyle/>
+        <a:p>
+          <a:pPr algn="l"/>
+          <a:r>
+            <a:rPr lang="es-MX" dirty="0"/>
+            <a:t>git push</a:t>
+          </a:r>
+        </a:p>
+      </dgm:t>
+    </dgm:pt>
+    <dgm:pt modelId="{C690EF8B-266E-4CC6-8172-330F1D832151}" type="parTrans" cxnId="{7F6DA1B1-D95F-4629-A78A-ED2463E315F1}">
+      <dgm:prSet/>
+      <dgm:spPr/>
+      <dgm:t>
+        <a:bodyPr/>
+        <a:lstStyle/>
+        <a:p>
+          <a:endParaRPr lang="es-MX"/>
+        </a:p>
+      </dgm:t>
+    </dgm:pt>
+    <dgm:pt modelId="{41DE74FF-FB8F-4AA3-975C-10BA25CF4154}" type="sibTrans" cxnId="{7F6DA1B1-D95F-4629-A78A-ED2463E315F1}">
+      <dgm:prSet/>
+      <dgm:spPr/>
+      <dgm:t>
+        <a:bodyPr/>
+        <a:lstStyle/>
+        <a:p>
+          <a:endParaRPr lang="es-MX"/>
+        </a:p>
+      </dgm:t>
+    </dgm:pt>
+    <dgm:pt modelId="{7483889B-3D58-46C2-A09A-66B24DE3C016}">
+      <dgm:prSet phldrT="[Texto]" custT="1"/>
+      <dgm:spPr/>
+      <dgm:t>
+        <a:bodyPr/>
+        <a:lstStyle/>
+        <a:p>
+          <a:pPr algn="l"/>
+          <a:r>
+            <a:rPr lang="es-MX" sz="1800" dirty="0"/>
+            <a:t>git checkout develop</a:t>
+          </a:r>
+        </a:p>
+      </dgm:t>
+    </dgm:pt>
+    <dgm:pt modelId="{5E9A3AB3-C2C4-475C-9B5D-306467CCE820}" type="parTrans" cxnId="{76E4012C-5D10-462E-9868-C30CE3081B6C}">
+      <dgm:prSet/>
+      <dgm:spPr/>
+      <dgm:t>
+        <a:bodyPr/>
+        <a:lstStyle/>
+        <a:p>
+          <a:endParaRPr lang="es-MX"/>
+        </a:p>
+      </dgm:t>
+    </dgm:pt>
+    <dgm:pt modelId="{7394E15B-D450-45E7-B825-3472229043A0}" type="sibTrans" cxnId="{76E4012C-5D10-462E-9868-C30CE3081B6C}">
+      <dgm:prSet/>
+      <dgm:spPr/>
+      <dgm:t>
+        <a:bodyPr/>
+        <a:lstStyle/>
+        <a:p>
+          <a:endParaRPr lang="es-MX"/>
+        </a:p>
+      </dgm:t>
+    </dgm:pt>
+    <dgm:pt modelId="{EF822E92-52C5-451D-8F2D-92EC3D2C851C}" type="pres">
+      <dgm:prSet presAssocID="{E656005C-A54B-4D69-82F6-B752790BCB3A}" presName="cycle" presStyleCnt="0">
+        <dgm:presLayoutVars>
+          <dgm:dir/>
+          <dgm:resizeHandles val="exact"/>
+        </dgm:presLayoutVars>
+      </dgm:prSet>
+      <dgm:spPr/>
+    </dgm:pt>
+    <dgm:pt modelId="{ADF95EC0-51FE-481D-8761-18BF0EA546CC}" type="pres">
+      <dgm:prSet presAssocID="{1AE6AC5D-41C3-4345-80DA-562E9AFCD6B2}" presName="node" presStyleLbl="node1" presStyleIdx="0" presStyleCnt="3" custScaleX="153095" custScaleY="103247" custRadScaleRad="107888" custRadScaleInc="55115">
+        <dgm:presLayoutVars>
+          <dgm:bulletEnabled val="1"/>
+        </dgm:presLayoutVars>
+      </dgm:prSet>
+      <dgm:spPr/>
+    </dgm:pt>
+    <dgm:pt modelId="{B6E8D090-072F-4695-BE3E-273CC38E866C}" type="pres">
+      <dgm:prSet presAssocID="{1AE6AC5D-41C3-4345-80DA-562E9AFCD6B2}" presName="spNode" presStyleCnt="0"/>
+      <dgm:spPr/>
+    </dgm:pt>
+    <dgm:pt modelId="{76BAC9AE-EE01-4894-B813-FCF4A7DCE485}" type="pres">
+      <dgm:prSet presAssocID="{C1D9201C-2AB1-4DE4-8A73-3241B5DA17F5}" presName="sibTrans" presStyleLbl="sibTrans1D1" presStyleIdx="0" presStyleCnt="3"/>
+      <dgm:spPr/>
+    </dgm:pt>
+    <dgm:pt modelId="{46215A3B-C43B-4026-AFE7-55694C6272C4}" type="pres">
+      <dgm:prSet presAssocID="{D13FCB60-EECF-4F9A-A43D-3DA74B79D49A}" presName="node" presStyleLbl="node1" presStyleIdx="1" presStyleCnt="3" custScaleX="163904" custScaleY="165166" custRadScaleRad="116653" custRadScaleInc="-10938">
+        <dgm:presLayoutVars>
+          <dgm:bulletEnabled val="1"/>
+        </dgm:presLayoutVars>
+      </dgm:prSet>
+      <dgm:spPr/>
+    </dgm:pt>
+    <dgm:pt modelId="{0481AB6C-F7F9-430F-BEE9-8451879B2E57}" type="pres">
+      <dgm:prSet presAssocID="{D13FCB60-EECF-4F9A-A43D-3DA74B79D49A}" presName="spNode" presStyleCnt="0"/>
+      <dgm:spPr/>
+    </dgm:pt>
+    <dgm:pt modelId="{208C01C6-C545-48C4-B402-9FC2C74FF4B7}" type="pres">
+      <dgm:prSet presAssocID="{80679AAE-4DE8-44EC-A913-2FA3D7083AE7}" presName="sibTrans" presStyleLbl="sibTrans1D1" presStyleIdx="1" presStyleCnt="3"/>
+      <dgm:spPr/>
+    </dgm:pt>
+    <dgm:pt modelId="{69785625-6A9D-4419-89E9-AC5FD1B4C405}" type="pres">
+      <dgm:prSet presAssocID="{3632C226-D928-455A-94A7-F6A9036A4F66}" presName="node" presStyleLbl="node1" presStyleIdx="2" presStyleCnt="3" custScaleX="125525" custScaleY="132291" custRadScaleRad="128684" custRadScaleInc="45693">
+        <dgm:presLayoutVars>
+          <dgm:bulletEnabled val="1"/>
+        </dgm:presLayoutVars>
+      </dgm:prSet>
+      <dgm:spPr/>
+    </dgm:pt>
+    <dgm:pt modelId="{C45B9D70-73A6-477D-85D9-2E9740305D92}" type="pres">
+      <dgm:prSet presAssocID="{3632C226-D928-455A-94A7-F6A9036A4F66}" presName="spNode" presStyleCnt="0"/>
+      <dgm:spPr/>
+    </dgm:pt>
+    <dgm:pt modelId="{BFA6CBB0-3A3E-485A-A2AB-3552B7C03B7A}" type="pres">
+      <dgm:prSet presAssocID="{25CF1AC2-03B7-4281-A6A0-4C13FB2B01D8}" presName="sibTrans" presStyleLbl="sibTrans1D1" presStyleIdx="2" presStyleCnt="3"/>
+      <dgm:spPr/>
+    </dgm:pt>
+  </dgm:ptLst>
+  <dgm:cxnLst>
+    <dgm:cxn modelId="{7C9F8604-CBA0-40B5-8E3D-8BF30CBB045D}" type="presOf" srcId="{A2155F2E-D190-4D0F-884C-A00B4DF6E57D}" destId="{46215A3B-C43B-4026-AFE7-55694C6272C4}" srcOrd="0" destOrd="4" presId="urn:microsoft.com/office/officeart/2005/8/layout/cycle5"/>
+    <dgm:cxn modelId="{31D1DA18-8FF6-4B06-8CBF-8CE03A8D8BC9}" srcId="{D13FCB60-EECF-4F9A-A43D-3DA74B79D49A}" destId="{49DD2E3B-D534-40DC-B4EC-977916C7E15C}" srcOrd="2" destOrd="0" parTransId="{C9ABF05C-39D4-400D-B5A3-E4C9C38275D4}" sibTransId="{BEB05271-45E6-4F0E-83A2-A0D9BA100682}"/>
+    <dgm:cxn modelId="{BD217B2A-0006-487E-BE18-06CF40327219}" srcId="{D13FCB60-EECF-4F9A-A43D-3DA74B79D49A}" destId="{8268AAB3-188F-4432-8BE3-166398EFD77A}" srcOrd="6" destOrd="0" parTransId="{FC5BFAE0-55A3-4734-A166-03CA4C9807BE}" sibTransId="{107246ED-E344-4D2B-863D-5E85465ABBD4}"/>
+    <dgm:cxn modelId="{76E4012C-5D10-462E-9868-C30CE3081B6C}" srcId="{1AE6AC5D-41C3-4345-80DA-562E9AFCD6B2}" destId="{7483889B-3D58-46C2-A09A-66B24DE3C016}" srcOrd="0" destOrd="0" parTransId="{5E9A3AB3-C2C4-475C-9B5D-306467CCE820}" sibTransId="{7394E15B-D450-45E7-B825-3472229043A0}"/>
+    <dgm:cxn modelId="{1B5AC82C-554B-42D1-B2EC-293ABCD42F46}" type="presOf" srcId="{E656005C-A54B-4D69-82F6-B752790BCB3A}" destId="{EF822E92-52C5-451D-8F2D-92EC3D2C851C}" srcOrd="0" destOrd="0" presId="urn:microsoft.com/office/officeart/2005/8/layout/cycle5"/>
+    <dgm:cxn modelId="{28817A2E-0CA0-47A8-A816-EDC1D8B3D37B}" srcId="{D13FCB60-EECF-4F9A-A43D-3DA74B79D49A}" destId="{A2155F2E-D190-4D0F-884C-A00B4DF6E57D}" srcOrd="3" destOrd="0" parTransId="{FC8543A4-4633-42B6-A5F1-1A7078AE613B}" sibTransId="{3B256354-0411-48BB-A4E9-23A602B34FC4}"/>
+    <dgm:cxn modelId="{BD712732-A796-426F-A54E-F9E79719C0B6}" srcId="{E656005C-A54B-4D69-82F6-B752790BCB3A}" destId="{1AE6AC5D-41C3-4345-80DA-562E9AFCD6B2}" srcOrd="0" destOrd="0" parTransId="{573FA441-9BD7-4155-8856-DF08193E077D}" sibTransId="{C1D9201C-2AB1-4DE4-8A73-3241B5DA17F5}"/>
+    <dgm:cxn modelId="{D8E1A335-EF0E-4214-A7F1-4FFB5CDAD27B}" type="presOf" srcId="{25CF1AC2-03B7-4281-A6A0-4C13FB2B01D8}" destId="{BFA6CBB0-3A3E-485A-A2AB-3552B7C03B7A}" srcOrd="0" destOrd="0" presId="urn:microsoft.com/office/officeart/2005/8/layout/cycle5"/>
+    <dgm:cxn modelId="{BD378237-CE8C-417E-BCD1-CD466337E0E5}" type="presOf" srcId="{C1D9201C-2AB1-4DE4-8A73-3241B5DA17F5}" destId="{76BAC9AE-EE01-4894-B813-FCF4A7DCE485}" srcOrd="0" destOrd="0" presId="urn:microsoft.com/office/officeart/2005/8/layout/cycle5"/>
+    <dgm:cxn modelId="{E5A9DD38-8F4B-48B2-AA0A-096421481BFE}" srcId="{E656005C-A54B-4D69-82F6-B752790BCB3A}" destId="{D13FCB60-EECF-4F9A-A43D-3DA74B79D49A}" srcOrd="1" destOrd="0" parTransId="{552C49FE-CC38-4211-A03D-7D87EE6C2D48}" sibTransId="{80679AAE-4DE8-44EC-A913-2FA3D7083AE7}"/>
+    <dgm:cxn modelId="{3D2D5B5D-45DA-447A-AB7B-ED898C7CFB27}" type="presOf" srcId="{BC2D9DCE-5929-4A6B-9F03-BCF92683C1D0}" destId="{46215A3B-C43B-4026-AFE7-55694C6272C4}" srcOrd="0" destOrd="6" presId="urn:microsoft.com/office/officeart/2005/8/layout/cycle5"/>
+    <dgm:cxn modelId="{54C26960-FBCD-4D19-A58B-B83F9865E6E5}" srcId="{D13FCB60-EECF-4F9A-A43D-3DA74B79D49A}" destId="{0369B0CA-E818-4571-9CEF-E89D2DBF9076}" srcOrd="0" destOrd="0" parTransId="{E5DAE76C-897F-42F8-BEC9-711986F5AD7D}" sibTransId="{3E79B4BB-B765-4222-8052-9EF288372F90}"/>
+    <dgm:cxn modelId="{881D8B42-111C-46C6-9505-C3F2188DA3D4}" srcId="{3632C226-D928-455A-94A7-F6A9036A4F66}" destId="{EAB4E03F-F607-41CF-AC59-065092F81F95}" srcOrd="0" destOrd="0" parTransId="{38E2F187-C7FD-42A8-BE50-B36A5A69377D}" sibTransId="{11806555-EA0E-4856-82E9-9AA5FA6B6E69}"/>
+    <dgm:cxn modelId="{945C8463-5A55-4831-AD56-833200317097}" type="presOf" srcId="{D13FCB60-EECF-4F9A-A43D-3DA74B79D49A}" destId="{46215A3B-C43B-4026-AFE7-55694C6272C4}" srcOrd="0" destOrd="0" presId="urn:microsoft.com/office/officeart/2005/8/layout/cycle5"/>
+    <dgm:cxn modelId="{FF08E047-CF0C-4EEC-BD40-1435875BEACD}" srcId="{3632C226-D928-455A-94A7-F6A9036A4F66}" destId="{B9E9B89B-95CE-497D-93E9-21AC24B43762}" srcOrd="1" destOrd="0" parTransId="{1F344831-2054-4AE6-A910-2D1EB1718503}" sibTransId="{EFA0C1E8-A500-43B3-87E1-0D5E7A4BFF76}"/>
+    <dgm:cxn modelId="{CDE1D249-9BC6-4ACB-B721-8C1E59866EF9}" type="presOf" srcId="{8268AAB3-188F-4432-8BE3-166398EFD77A}" destId="{46215A3B-C43B-4026-AFE7-55694C6272C4}" srcOrd="0" destOrd="7" presId="urn:microsoft.com/office/officeart/2005/8/layout/cycle5"/>
+    <dgm:cxn modelId="{686B8570-BAB4-4F55-8EE0-62479DFA0393}" type="presOf" srcId="{49DD2E3B-D534-40DC-B4EC-977916C7E15C}" destId="{46215A3B-C43B-4026-AFE7-55694C6272C4}" srcOrd="0" destOrd="3" presId="urn:microsoft.com/office/officeart/2005/8/layout/cycle5"/>
+    <dgm:cxn modelId="{6A7B2A54-2829-4DAF-892D-DA8DFE4B5538}" type="presOf" srcId="{A5D2CFB7-0BE2-4C62-A6C9-7A62562F1C98}" destId="{ADF95EC0-51FE-481D-8761-18BF0EA546CC}" srcOrd="0" destOrd="2" presId="urn:microsoft.com/office/officeart/2005/8/layout/cycle5"/>
+    <dgm:cxn modelId="{D984A074-6F89-4260-86FC-FB617D911B99}" srcId="{E656005C-A54B-4D69-82F6-B752790BCB3A}" destId="{3632C226-D928-455A-94A7-F6A9036A4F66}" srcOrd="2" destOrd="0" parTransId="{093DAAD6-E889-4358-831F-173BED595128}" sibTransId="{25CF1AC2-03B7-4281-A6A0-4C13FB2B01D8}"/>
+    <dgm:cxn modelId="{3265E675-4AF6-4B28-97B2-BA871C7BB0C7}" type="presOf" srcId="{0369B0CA-E818-4571-9CEF-E89D2DBF9076}" destId="{46215A3B-C43B-4026-AFE7-55694C6272C4}" srcOrd="0" destOrd="1" presId="urn:microsoft.com/office/officeart/2005/8/layout/cycle5"/>
+    <dgm:cxn modelId="{0CA48856-F761-46CD-A7FF-77DBD464D133}" type="presOf" srcId="{80679AAE-4DE8-44EC-A913-2FA3D7083AE7}" destId="{208C01C6-C545-48C4-B402-9FC2C74FF4B7}" srcOrd="0" destOrd="0" presId="urn:microsoft.com/office/officeart/2005/8/layout/cycle5"/>
+    <dgm:cxn modelId="{A1EBA757-2D89-4CB7-82EE-A51BB500A5D1}" type="presOf" srcId="{EA7AE219-2DD3-41E1-94F6-DD2A7A762ADA}" destId="{46215A3B-C43B-4026-AFE7-55694C6272C4}" srcOrd="0" destOrd="5" presId="urn:microsoft.com/office/officeart/2005/8/layout/cycle5"/>
+    <dgm:cxn modelId="{B051B27C-A68B-4953-A789-219CFF4B1B1B}" type="presOf" srcId="{1AE6AC5D-41C3-4345-80DA-562E9AFCD6B2}" destId="{ADF95EC0-51FE-481D-8761-18BF0EA546CC}" srcOrd="0" destOrd="0" presId="urn:microsoft.com/office/officeart/2005/8/layout/cycle5"/>
+    <dgm:cxn modelId="{30C9C67E-FD02-437F-9BDF-49FFDF24B102}" srcId="{D13FCB60-EECF-4F9A-A43D-3DA74B79D49A}" destId="{62CF9BB1-C850-4B3F-A56A-E1BE4BABE2E6}" srcOrd="1" destOrd="0" parTransId="{D40F20CD-78CE-4300-A0E2-01CD788E6E5E}" sibTransId="{FD63647A-4E56-46E2-8F14-79E384331C98}"/>
+    <dgm:cxn modelId="{5741BB82-8EB5-495A-8138-FE0BF1EFD635}" srcId="{1AE6AC5D-41C3-4345-80DA-562E9AFCD6B2}" destId="{A5D2CFB7-0BE2-4C62-A6C9-7A62562F1C98}" srcOrd="1" destOrd="0" parTransId="{6F12079D-0A38-4660-B65F-C29AAFB006F3}" sibTransId="{7958D468-A3CB-41DC-B9C9-5E1D69A42666}"/>
+    <dgm:cxn modelId="{A7766D83-BF05-483A-B815-481DFBAAD6BC}" type="presOf" srcId="{B9E9B89B-95CE-497D-93E9-21AC24B43762}" destId="{69785625-6A9D-4419-89E9-AC5FD1B4C405}" srcOrd="0" destOrd="2" presId="urn:microsoft.com/office/officeart/2005/8/layout/cycle5"/>
+    <dgm:cxn modelId="{F4CC2D84-2E3F-4528-B2D1-789875392C6F}" type="presOf" srcId="{C548FDC1-91AD-4EE2-8C44-58015CBDCAD1}" destId="{69785625-6A9D-4419-89E9-AC5FD1B4C405}" srcOrd="0" destOrd="4" presId="urn:microsoft.com/office/officeart/2005/8/layout/cycle5"/>
+    <dgm:cxn modelId="{DBED5D85-5795-4529-9B19-B8BC79596EA3}" type="presOf" srcId="{EAB4E03F-F607-41CF-AC59-065092F81F95}" destId="{69785625-6A9D-4419-89E9-AC5FD1B4C405}" srcOrd="0" destOrd="1" presId="urn:microsoft.com/office/officeart/2005/8/layout/cycle5"/>
+    <dgm:cxn modelId="{3F399791-5E6B-4891-ABC2-F023B670673A}" srcId="{1AE6AC5D-41C3-4345-80DA-562E9AFCD6B2}" destId="{B359D2F3-12FA-49F7-BC18-C0E97F4BCE58}" srcOrd="2" destOrd="0" parTransId="{F2E23D58-66B3-4B08-8E70-E121A2EEA76E}" sibTransId="{8AFB3107-52B0-4F50-B939-747297CF2519}"/>
+    <dgm:cxn modelId="{7F6DA1B1-D95F-4629-A78A-ED2463E315F1}" srcId="{3632C226-D928-455A-94A7-F6A9036A4F66}" destId="{C548FDC1-91AD-4EE2-8C44-58015CBDCAD1}" srcOrd="3" destOrd="0" parTransId="{C690EF8B-266E-4CC6-8172-330F1D832151}" sibTransId="{41DE74FF-FB8F-4AA3-975C-10BA25CF4154}"/>
+    <dgm:cxn modelId="{6AF02DB3-0787-4777-B535-C8148268F7E3}" type="presOf" srcId="{F2257F09-2DA7-406F-92D5-9D5BC3BCDF63}" destId="{69785625-6A9D-4419-89E9-AC5FD1B4C405}" srcOrd="0" destOrd="3" presId="urn:microsoft.com/office/officeart/2005/8/layout/cycle5"/>
+    <dgm:cxn modelId="{7CA29CC1-B66D-42CE-9A8B-A9DBF147384E}" type="presOf" srcId="{62CF9BB1-C850-4B3F-A56A-E1BE4BABE2E6}" destId="{46215A3B-C43B-4026-AFE7-55694C6272C4}" srcOrd="0" destOrd="2" presId="urn:microsoft.com/office/officeart/2005/8/layout/cycle5"/>
+    <dgm:cxn modelId="{5806E1C5-E80E-47FC-B697-4A9DE27FAE11}" srcId="{D13FCB60-EECF-4F9A-A43D-3DA74B79D49A}" destId="{EA7AE219-2DD3-41E1-94F6-DD2A7A762ADA}" srcOrd="4" destOrd="0" parTransId="{63D85AFB-F8DA-48FD-81EC-C3E8767C14D9}" sibTransId="{26750CF5-8EC0-4D63-BA34-61A13206E45C}"/>
+    <dgm:cxn modelId="{A37FE0CD-2464-46A8-B326-7EDEB0A4B252}" srcId="{3632C226-D928-455A-94A7-F6A9036A4F66}" destId="{F2257F09-2DA7-406F-92D5-9D5BC3BCDF63}" srcOrd="2" destOrd="0" parTransId="{CE2FB192-0176-48CB-A53D-74E60F1ABE9C}" sibTransId="{DD300A03-B1B2-4701-8288-0908E3879803}"/>
+    <dgm:cxn modelId="{5FABFDDF-FB31-45AC-A180-CDE644573C5A}" srcId="{D13FCB60-EECF-4F9A-A43D-3DA74B79D49A}" destId="{BC2D9DCE-5929-4A6B-9F03-BCF92683C1D0}" srcOrd="5" destOrd="0" parTransId="{6ADE0E61-6BC5-4A35-AE10-4FD55ED26D55}" sibTransId="{40800D22-FE73-4F8F-8B01-ED2E46F0C321}"/>
+    <dgm:cxn modelId="{2E1900E0-1DE0-46D8-B3A1-08E3435CC472}" type="presOf" srcId="{7483889B-3D58-46C2-A09A-66B24DE3C016}" destId="{ADF95EC0-51FE-481D-8761-18BF0EA546CC}" srcOrd="0" destOrd="1" presId="urn:microsoft.com/office/officeart/2005/8/layout/cycle5"/>
+    <dgm:cxn modelId="{3B5AC3E7-D0E8-4CFC-922D-C81FCF543F2E}" type="presOf" srcId="{B359D2F3-12FA-49F7-BC18-C0E97F4BCE58}" destId="{ADF95EC0-51FE-481D-8761-18BF0EA546CC}" srcOrd="0" destOrd="3" presId="urn:microsoft.com/office/officeart/2005/8/layout/cycle5"/>
+    <dgm:cxn modelId="{C27F5FE9-927A-443C-95DE-7042B44C92D6}" type="presOf" srcId="{3632C226-D928-455A-94A7-F6A9036A4F66}" destId="{69785625-6A9D-4419-89E9-AC5FD1B4C405}" srcOrd="0" destOrd="0" presId="urn:microsoft.com/office/officeart/2005/8/layout/cycle5"/>
+    <dgm:cxn modelId="{0945B1D1-90BD-4545-8922-BB166323208E}" type="presParOf" srcId="{EF822E92-52C5-451D-8F2D-92EC3D2C851C}" destId="{ADF95EC0-51FE-481D-8761-18BF0EA546CC}" srcOrd="0" destOrd="0" presId="urn:microsoft.com/office/officeart/2005/8/layout/cycle5"/>
+    <dgm:cxn modelId="{F50221EC-0FDD-4475-A4AB-21B10D4A6359}" type="presParOf" srcId="{EF822E92-52C5-451D-8F2D-92EC3D2C851C}" destId="{B6E8D090-072F-4695-BE3E-273CC38E866C}" srcOrd="1" destOrd="0" presId="urn:microsoft.com/office/officeart/2005/8/layout/cycle5"/>
+    <dgm:cxn modelId="{AAE107E7-728D-4518-B4D2-58164104094B}" type="presParOf" srcId="{EF822E92-52C5-451D-8F2D-92EC3D2C851C}" destId="{76BAC9AE-EE01-4894-B813-FCF4A7DCE485}" srcOrd="2" destOrd="0" presId="urn:microsoft.com/office/officeart/2005/8/layout/cycle5"/>
+    <dgm:cxn modelId="{C9E171D7-3668-4C7A-8CD3-02D2CFD60BE5}" type="presParOf" srcId="{EF822E92-52C5-451D-8F2D-92EC3D2C851C}" destId="{46215A3B-C43B-4026-AFE7-55694C6272C4}" srcOrd="3" destOrd="0" presId="urn:microsoft.com/office/officeart/2005/8/layout/cycle5"/>
+    <dgm:cxn modelId="{2A50C4FE-741B-4378-BF68-C970AFED232F}" type="presParOf" srcId="{EF822E92-52C5-451D-8F2D-92EC3D2C851C}" destId="{0481AB6C-F7F9-430F-BEE9-8451879B2E57}" srcOrd="4" destOrd="0" presId="urn:microsoft.com/office/officeart/2005/8/layout/cycle5"/>
+    <dgm:cxn modelId="{D8557F95-52A9-4B70-B3C8-4BE7C0FD3662}" type="presParOf" srcId="{EF822E92-52C5-451D-8F2D-92EC3D2C851C}" destId="{208C01C6-C545-48C4-B402-9FC2C74FF4B7}" srcOrd="5" destOrd="0" presId="urn:microsoft.com/office/officeart/2005/8/layout/cycle5"/>
+    <dgm:cxn modelId="{2828A402-D2EE-4C5D-9DA3-49A87027C4D6}" type="presParOf" srcId="{EF822E92-52C5-451D-8F2D-92EC3D2C851C}" destId="{69785625-6A9D-4419-89E9-AC5FD1B4C405}" srcOrd="6" destOrd="0" presId="urn:microsoft.com/office/officeart/2005/8/layout/cycle5"/>
+    <dgm:cxn modelId="{F11D1AC5-64E6-448D-82E0-4B7C4C5D2DD9}" type="presParOf" srcId="{EF822E92-52C5-451D-8F2D-92EC3D2C851C}" destId="{C45B9D70-73A6-477D-85D9-2E9740305D92}" srcOrd="7" destOrd="0" presId="urn:microsoft.com/office/officeart/2005/8/layout/cycle5"/>
+    <dgm:cxn modelId="{51865E7F-95C7-4DD3-885B-E9AA98DCC280}" type="presParOf" srcId="{EF822E92-52C5-451D-8F2D-92EC3D2C851C}" destId="{BFA6CBB0-3A3E-485A-A2AB-3552B7C03B7A}" srcOrd="8" destOrd="0" presId="urn:microsoft.com/office/officeart/2005/8/layout/cycle5"/>
+  </dgm:cxnLst>
+  <dgm:bg/>
+  <dgm:whole/>
+  <dgm:extLst>
+    <a:ext uri="http://schemas.microsoft.com/office/drawing/2008/diagram">
+      <dsp:dataModelExt xmlns:dsp="http://schemas.microsoft.com/office/drawing/2008/diagram" relId="rId6" minVer="http://schemas.openxmlformats.org/drawingml/2006/diagram"/>
+    </a:ext>
+  </dgm:extLst>
+</dgm:dataModel>
+</file>
+
+<file path=ppt/diagrams/drawing1.xml><?xml version="1.0" encoding="utf-8"?>
+<dsp:drawing xmlns:dgm="http://schemas.openxmlformats.org/drawingml/2006/diagram" xmlns:dsp="http://schemas.microsoft.com/office/drawing/2008/diagram" xmlns:a="http://schemas.openxmlformats.org/drawingml/2006/main">
+  <dsp:spTree>
+    <dsp:nvGrpSpPr>
+      <dsp:cNvPr id="0" name=""/>
+      <dsp:cNvGrpSpPr/>
+    </dsp:nvGrpSpPr>
+    <dsp:grpSpPr/>
+    <dsp:sp modelId="{ADF95EC0-51FE-481D-8761-18BF0EA546CC}">
+      <dsp:nvSpPr>
+        <dsp:cNvPr id="0" name=""/>
+        <dsp:cNvSpPr/>
+      </dsp:nvSpPr>
+      <dsp:spPr>
+        <a:xfrm>
+          <a:off x="3458049" y="-12986"/>
+          <a:ext cx="4094739" cy="1794965"/>
+        </a:xfrm>
+        <a:prstGeom prst="roundRect">
+          <a:avLst/>
+        </a:prstGeom>
+        <a:gradFill rotWithShape="0">
+          <a:gsLst>
+            <a:gs pos="0">
+              <a:schemeClr val="accent1">
+                <a:hueOff val="0"/>
+                <a:satOff val="0"/>
+                <a:lumOff val="0"/>
+                <a:alphaOff val="0"/>
+                <a:satMod val="103000"/>
+                <a:lumMod val="102000"/>
+                <a:tint val="94000"/>
+              </a:schemeClr>
+            </a:gs>
+            <a:gs pos="50000">
+              <a:schemeClr val="accent1">
+                <a:hueOff val="0"/>
+                <a:satOff val="0"/>
+                <a:lumOff val="0"/>
+                <a:alphaOff val="0"/>
+                <a:satMod val="110000"/>
+                <a:lumMod val="100000"/>
+                <a:shade val="100000"/>
+              </a:schemeClr>
+            </a:gs>
+            <a:gs pos="100000">
+              <a:schemeClr val="accent1">
+                <a:hueOff val="0"/>
+                <a:satOff val="0"/>
+                <a:lumOff val="0"/>
+                <a:alphaOff val="0"/>
+                <a:lumMod val="99000"/>
+                <a:satMod val="120000"/>
+                <a:shade val="78000"/>
+              </a:schemeClr>
+            </a:gs>
+          </a:gsLst>
+          <a:lin ang="5400000" scaled="0"/>
+        </a:gradFill>
+        <a:ln>
+          <a:noFill/>
+        </a:ln>
+        <a:effectLst/>
+        <a:scene3d>
+          <a:camera prst="orthographicFront"/>
+          <a:lightRig rig="threePt" dir="t">
+            <a:rot lat="0" lon="0" rev="7500000"/>
+          </a:lightRig>
+        </a:scene3d>
+        <a:sp3d prstMaterial="plastic">
+          <a:bevelT w="127000" h="25400" prst="relaxedInset"/>
+        </a:sp3d>
+      </dsp:spPr>
+      <dsp:style>
+        <a:lnRef idx="0">
+          <a:scrgbClr r="0" g="0" b="0"/>
+        </a:lnRef>
+        <a:fillRef idx="3">
+          <a:scrgbClr r="0" g="0" b="0"/>
+        </a:fillRef>
+        <a:effectRef idx="2">
+          <a:scrgbClr r="0" g="0" b="0"/>
+        </a:effectRef>
+        <a:fontRef idx="minor">
+          <a:schemeClr val="lt1"/>
+        </a:fontRef>
+      </dsp:style>
+      <dsp:txBody>
+        <a:bodyPr spcFirstLastPara="0" vert="horz" wrap="square" lIns="91440" tIns="91440" rIns="91440" bIns="91440" numCol="1" spcCol="1270" anchor="t" anchorCtr="0">
+          <a:noAutofit/>
+        </a:bodyPr>
+        <a:lstStyle/>
+        <a:p>
+          <a:pPr marL="0" lvl="0" indent="0" algn="ctr" defTabSz="1066800">
+            <a:lnSpc>
+              <a:spcPct val="90000"/>
+            </a:lnSpc>
+            <a:spcBef>
+              <a:spcPct val="0"/>
+            </a:spcBef>
+            <a:spcAft>
+              <a:spcPct val="35000"/>
+            </a:spcAft>
+            <a:buNone/>
+          </a:pPr>
+          <a:r>
+            <a:rPr lang="es-MX" sz="2400" kern="1200" dirty="0"/>
+            <a:t>Crear rama</a:t>
+          </a:r>
+        </a:p>
+        <a:p>
+          <a:pPr marL="171450" lvl="1" indent="-171450" algn="l" defTabSz="800100">
+            <a:lnSpc>
+              <a:spcPct val="90000"/>
+            </a:lnSpc>
+            <a:spcBef>
+              <a:spcPct val="0"/>
+            </a:spcBef>
+            <a:spcAft>
+              <a:spcPct val="15000"/>
+            </a:spcAft>
+            <a:buChar char="•"/>
+          </a:pPr>
+          <a:r>
+            <a:rPr lang="es-MX" sz="1800" kern="1200" dirty="0"/>
+            <a:t>git checkout develop</a:t>
+          </a:r>
+        </a:p>
+        <a:p>
+          <a:pPr marL="171450" lvl="1" indent="-171450" algn="l" defTabSz="800100">
+            <a:lnSpc>
+              <a:spcPct val="90000"/>
+            </a:lnSpc>
+            <a:spcBef>
+              <a:spcPct val="0"/>
+            </a:spcBef>
+            <a:spcAft>
+              <a:spcPct val="15000"/>
+            </a:spcAft>
+            <a:buChar char="•"/>
+          </a:pPr>
+          <a:r>
+            <a:rPr lang="es-MX" sz="1800" kern="1200" dirty="0"/>
+            <a:t>git pull</a:t>
+          </a:r>
+        </a:p>
+        <a:p>
+          <a:pPr marL="171450" lvl="1" indent="-171450" algn="l" defTabSz="800100">
+            <a:lnSpc>
+              <a:spcPct val="90000"/>
+            </a:lnSpc>
+            <a:spcBef>
+              <a:spcPct val="0"/>
+            </a:spcBef>
+            <a:spcAft>
+              <a:spcPct val="15000"/>
+            </a:spcAft>
+            <a:buChar char="•"/>
+          </a:pPr>
+          <a:r>
+            <a:rPr lang="es-MX" sz="1800" kern="1200" dirty="0"/>
+            <a:t>git checkout –b “nombreRama”</a:t>
+          </a:r>
+        </a:p>
+      </dsp:txBody>
+      <dsp:txXfrm>
+        <a:off x="3545672" y="74637"/>
+        <a:ext cx="3919493" cy="1619719"/>
+      </dsp:txXfrm>
+    </dsp:sp>
+    <dsp:sp modelId="{76BAC9AE-EE01-4894-B813-FCF4A7DCE485}">
+      <dsp:nvSpPr>
+        <dsp:cNvPr id="0" name=""/>
+        <dsp:cNvSpPr/>
+      </dsp:nvSpPr>
+      <dsp:spPr>
+        <a:xfrm>
+          <a:off x="2669358" y="1108820"/>
+          <a:ext cx="4643234" cy="4643234"/>
+        </a:xfrm>
+        <a:custGeom>
+          <a:avLst/>
+          <a:gdLst/>
+          <a:ahLst/>
+          <a:cxnLst/>
+          <a:rect l="0" t="0" r="0" b="0"/>
+          <a:pathLst>
+            <a:path>
+              <a:moveTo>
+                <a:pt x="4133137" y="869618"/>
+              </a:moveTo>
+              <a:arcTo wR="2321617" hR="2321617" stAng="19277195" swAng="1202026"/>
+            </a:path>
+          </a:pathLst>
+        </a:custGeom>
+        <a:noFill/>
+        <a:ln w="6350" cap="flat" cmpd="sng" algn="ctr">
+          <a:solidFill>
+            <a:schemeClr val="accent1">
+              <a:hueOff val="0"/>
+              <a:satOff val="0"/>
+              <a:lumOff val="0"/>
+              <a:alphaOff val="0"/>
+            </a:schemeClr>
+          </a:solidFill>
+          <a:prstDash val="solid"/>
+          <a:miter lim="800000"/>
+          <a:tailEnd type="arrow"/>
+        </a:ln>
+        <a:effectLst/>
+        <a:scene3d>
+          <a:camera prst="orthographicFront"/>
+          <a:lightRig rig="threePt" dir="t">
+            <a:rot lat="0" lon="0" rev="7500000"/>
+          </a:lightRig>
+        </a:scene3d>
+        <a:sp3d z="-40000" prstMaterial="matte"/>
+      </dsp:spPr>
+      <dsp:style>
+        <a:lnRef idx="1">
+          <a:scrgbClr r="0" g="0" b="0"/>
+        </a:lnRef>
+        <a:fillRef idx="0">
+          <a:scrgbClr r="0" g="0" b="0"/>
+        </a:fillRef>
+        <a:effectRef idx="0">
+          <a:scrgbClr r="0" g="0" b="0"/>
+        </a:effectRef>
+        <a:fontRef idx="minor"/>
+      </dsp:style>
+    </dsp:sp>
+    <dsp:sp modelId="{46215A3B-C43B-4026-AFE7-55694C6272C4}">
+      <dsp:nvSpPr>
+        <dsp:cNvPr id="0" name=""/>
+        <dsp:cNvSpPr/>
+      </dsp:nvSpPr>
+      <dsp:spPr>
+        <a:xfrm>
+          <a:off x="4815208" y="2941631"/>
+          <a:ext cx="4383841" cy="2871436"/>
+        </a:xfrm>
+        <a:prstGeom prst="roundRect">
+          <a:avLst/>
+        </a:prstGeom>
+        <a:gradFill rotWithShape="0">
+          <a:gsLst>
+            <a:gs pos="0">
+              <a:schemeClr val="accent1">
+                <a:hueOff val="0"/>
+                <a:satOff val="0"/>
+                <a:lumOff val="0"/>
+                <a:alphaOff val="0"/>
+                <a:satMod val="103000"/>
+                <a:lumMod val="102000"/>
+                <a:tint val="94000"/>
+              </a:schemeClr>
+            </a:gs>
+            <a:gs pos="50000">
+              <a:schemeClr val="accent1">
+                <a:hueOff val="0"/>
+                <a:satOff val="0"/>
+                <a:lumOff val="0"/>
+                <a:alphaOff val="0"/>
+                <a:satMod val="110000"/>
+                <a:lumMod val="100000"/>
+                <a:shade val="100000"/>
+              </a:schemeClr>
+            </a:gs>
+            <a:gs pos="100000">
+              <a:schemeClr val="accent1">
+                <a:hueOff val="0"/>
+                <a:satOff val="0"/>
+                <a:lumOff val="0"/>
+                <a:alphaOff val="0"/>
+                <a:lumMod val="99000"/>
+                <a:satMod val="120000"/>
+                <a:shade val="78000"/>
+              </a:schemeClr>
+            </a:gs>
+          </a:gsLst>
+          <a:lin ang="5400000" scaled="0"/>
+        </a:gradFill>
+        <a:ln>
+          <a:noFill/>
+        </a:ln>
+        <a:effectLst/>
+        <a:scene3d>
+          <a:camera prst="orthographicFront"/>
+          <a:lightRig rig="threePt" dir="t">
+            <a:rot lat="0" lon="0" rev="7500000"/>
+          </a:lightRig>
+        </a:scene3d>
+        <a:sp3d prstMaterial="plastic">
+          <a:bevelT w="127000" h="25400" prst="relaxedInset"/>
+        </a:sp3d>
+      </dsp:spPr>
+      <dsp:style>
+        <a:lnRef idx="0">
+          <a:scrgbClr r="0" g="0" b="0"/>
+        </a:lnRef>
+        <a:fillRef idx="3">
+          <a:scrgbClr r="0" g="0" b="0"/>
+        </a:fillRef>
+        <a:effectRef idx="2">
+          <a:scrgbClr r="0" g="0" b="0"/>
+        </a:effectRef>
+        <a:fontRef idx="minor">
+          <a:schemeClr val="lt1"/>
+        </a:fontRef>
+      </dsp:style>
+      <dsp:txBody>
+        <a:bodyPr spcFirstLastPara="0" vert="horz" wrap="square" lIns="91440" tIns="91440" rIns="91440" bIns="91440" numCol="1" spcCol="1270" anchor="t" anchorCtr="0">
+          <a:noAutofit/>
+        </a:bodyPr>
+        <a:lstStyle/>
+        <a:p>
+          <a:pPr marL="0" lvl="0" indent="0" algn="ctr" defTabSz="1066800">
+            <a:lnSpc>
+              <a:spcPct val="90000"/>
+            </a:lnSpc>
+            <a:spcBef>
+              <a:spcPct val="0"/>
+            </a:spcBef>
+            <a:spcAft>
+              <a:spcPct val="35000"/>
+            </a:spcAft>
+            <a:buNone/>
+          </a:pPr>
+          <a:r>
+            <a:rPr lang="es-MX" sz="2400" kern="1200" dirty="0"/>
+            <a:t>Trabajo</a:t>
+          </a:r>
+        </a:p>
+        <a:p>
+          <a:pPr marL="171450" lvl="1" indent="-171450" algn="l" defTabSz="800100">
+            <a:lnSpc>
+              <a:spcPct val="90000"/>
+            </a:lnSpc>
+            <a:spcBef>
+              <a:spcPct val="0"/>
+            </a:spcBef>
+            <a:spcAft>
+              <a:spcPct val="15000"/>
+            </a:spcAft>
+            <a:buChar char="•"/>
+          </a:pPr>
+          <a:r>
+            <a:rPr lang="es-MX" sz="1800" kern="1200" dirty="0"/>
+            <a:t>git add –A</a:t>
+          </a:r>
+        </a:p>
+        <a:p>
+          <a:pPr marL="171450" lvl="1" indent="-171450" algn="l" defTabSz="800100">
+            <a:lnSpc>
+              <a:spcPct val="90000"/>
+            </a:lnSpc>
+            <a:spcBef>
+              <a:spcPct val="0"/>
+            </a:spcBef>
+            <a:spcAft>
+              <a:spcPct val="15000"/>
+            </a:spcAft>
+            <a:buChar char="•"/>
+          </a:pPr>
+          <a:r>
+            <a:rPr lang="es-MX" sz="1800" kern="1200" dirty="0"/>
+            <a:t>git commit –m “mensaje”</a:t>
+          </a:r>
+        </a:p>
+        <a:p>
+          <a:pPr marL="171450" lvl="1" indent="-171450" algn="l" defTabSz="800100">
+            <a:lnSpc>
+              <a:spcPct val="90000"/>
+            </a:lnSpc>
+            <a:spcBef>
+              <a:spcPct val="0"/>
+            </a:spcBef>
+            <a:spcAft>
+              <a:spcPct val="15000"/>
+            </a:spcAft>
+            <a:buChar char="•"/>
+          </a:pPr>
+          <a:r>
+            <a:rPr lang="es-MX" sz="1800" kern="1200" dirty="0"/>
+            <a:t>git add –A</a:t>
+          </a:r>
+        </a:p>
+        <a:p>
+          <a:pPr marL="171450" lvl="1" indent="-171450" algn="l" defTabSz="800100">
+            <a:lnSpc>
+              <a:spcPct val="90000"/>
+            </a:lnSpc>
+            <a:spcBef>
+              <a:spcPct val="0"/>
+            </a:spcBef>
+            <a:spcAft>
+              <a:spcPct val="15000"/>
+            </a:spcAft>
+            <a:buChar char="•"/>
+          </a:pPr>
+          <a:r>
+            <a:rPr lang="es-MX" sz="1800" kern="1200" dirty="0"/>
+            <a:t>git commit –m “mensaje”</a:t>
+          </a:r>
+        </a:p>
+        <a:p>
+          <a:pPr marL="171450" lvl="1" indent="-171450" algn="l" defTabSz="800100">
+            <a:lnSpc>
+              <a:spcPct val="90000"/>
+            </a:lnSpc>
+            <a:spcBef>
+              <a:spcPct val="0"/>
+            </a:spcBef>
+            <a:spcAft>
+              <a:spcPct val="15000"/>
+            </a:spcAft>
+            <a:buChar char="•"/>
+          </a:pPr>
+          <a:r>
+            <a:rPr lang="es-MX" sz="1800" kern="1200" dirty="0"/>
+            <a:t>…</a:t>
+          </a:r>
+        </a:p>
+        <a:p>
+          <a:pPr marL="171450" lvl="1" indent="-171450" algn="l" defTabSz="800100">
+            <a:lnSpc>
+              <a:spcPct val="90000"/>
+            </a:lnSpc>
+            <a:spcBef>
+              <a:spcPct val="0"/>
+            </a:spcBef>
+            <a:spcAft>
+              <a:spcPct val="15000"/>
+            </a:spcAft>
+            <a:buChar char="•"/>
+          </a:pPr>
+          <a:r>
+            <a:rPr lang="es-MX" sz="1800" kern="1200" dirty="0"/>
+            <a:t>git pull</a:t>
+          </a:r>
+        </a:p>
+        <a:p>
+          <a:pPr marL="171450" lvl="1" indent="-171450" algn="l" defTabSz="800100">
+            <a:lnSpc>
+              <a:spcPct val="90000"/>
+            </a:lnSpc>
+            <a:spcBef>
+              <a:spcPct val="0"/>
+            </a:spcBef>
+            <a:spcAft>
+              <a:spcPct val="15000"/>
+            </a:spcAft>
+            <a:buChar char="•"/>
+          </a:pPr>
+          <a:r>
+            <a:rPr lang="es-MX" sz="1800" kern="1200" dirty="0"/>
+            <a:t>git push</a:t>
+          </a:r>
+        </a:p>
+      </dsp:txBody>
+      <dsp:txXfrm>
+        <a:off x="4955380" y="3081803"/>
+        <a:ext cx="4103497" cy="2591092"/>
+      </dsp:txXfrm>
+    </dsp:sp>
+    <dsp:sp modelId="{208C01C6-C545-48C4-B402-9FC2C74FF4B7}">
+      <dsp:nvSpPr>
+        <dsp:cNvPr id="0" name=""/>
+        <dsp:cNvSpPr/>
+      </dsp:nvSpPr>
+      <dsp:spPr>
+        <a:xfrm>
+          <a:off x="1868032" y="1451990"/>
+          <a:ext cx="4643234" cy="4643234"/>
+        </a:xfrm>
+        <a:custGeom>
+          <a:avLst/>
+          <a:gdLst/>
+          <a:ahLst/>
+          <a:cxnLst/>
+          <a:rect l="0" t="0" r="0" b="0"/>
+          <a:pathLst>
+            <a:path>
+              <a:moveTo>
+                <a:pt x="2830503" y="4586775"/>
+              </a:moveTo>
+              <a:arcTo wR="2321617" hR="2321617" stAng="4640296" swAng="3357707"/>
+            </a:path>
+          </a:pathLst>
+        </a:custGeom>
+        <a:noFill/>
+        <a:ln w="6350" cap="flat" cmpd="sng" algn="ctr">
+          <a:solidFill>
+            <a:schemeClr val="accent1">
+              <a:hueOff val="0"/>
+              <a:satOff val="0"/>
+              <a:lumOff val="0"/>
+              <a:alphaOff val="0"/>
+            </a:schemeClr>
+          </a:solidFill>
+          <a:prstDash val="solid"/>
+          <a:miter lim="800000"/>
+          <a:tailEnd type="arrow"/>
+        </a:ln>
+        <a:effectLst/>
+        <a:scene3d>
+          <a:camera prst="orthographicFront"/>
+          <a:lightRig rig="threePt" dir="t">
+            <a:rot lat="0" lon="0" rev="7500000"/>
+          </a:lightRig>
+        </a:scene3d>
+        <a:sp3d z="-40000" prstMaterial="matte"/>
+      </dsp:spPr>
+      <dsp:style>
+        <a:lnRef idx="1">
+          <a:scrgbClr r="0" g="0" b="0"/>
+        </a:lnRef>
+        <a:fillRef idx="0">
+          <a:scrgbClr r="0" g="0" b="0"/>
+        </a:fillRef>
+        <a:effectRef idx="0">
+          <a:scrgbClr r="0" g="0" b="0"/>
+        </a:effectRef>
+        <a:fontRef idx="minor"/>
+      </dsp:style>
+    </dsp:sp>
+    <dsp:sp modelId="{69785625-6A9D-4419-89E9-AC5FD1B4C405}">
+      <dsp:nvSpPr>
+        <dsp:cNvPr id="0" name=""/>
+        <dsp:cNvSpPr/>
+      </dsp:nvSpPr>
+      <dsp:spPr>
+        <a:xfrm>
+          <a:off x="0" y="2663154"/>
+          <a:ext cx="3357341" cy="2299899"/>
+        </a:xfrm>
+        <a:prstGeom prst="roundRect">
+          <a:avLst/>
+        </a:prstGeom>
+        <a:gradFill rotWithShape="0">
+          <a:gsLst>
+            <a:gs pos="0">
+              <a:schemeClr val="accent1">
+                <a:hueOff val="0"/>
+                <a:satOff val="0"/>
+                <a:lumOff val="0"/>
+                <a:alphaOff val="0"/>
+                <a:satMod val="103000"/>
+                <a:lumMod val="102000"/>
+                <a:tint val="94000"/>
+              </a:schemeClr>
+            </a:gs>
+            <a:gs pos="50000">
+              <a:schemeClr val="accent1">
+                <a:hueOff val="0"/>
+                <a:satOff val="0"/>
+                <a:lumOff val="0"/>
+                <a:alphaOff val="0"/>
+                <a:satMod val="110000"/>
+                <a:lumMod val="100000"/>
+                <a:shade val="100000"/>
+              </a:schemeClr>
+            </a:gs>
+            <a:gs pos="100000">
+              <a:schemeClr val="accent1">
+                <a:hueOff val="0"/>
+                <a:satOff val="0"/>
+                <a:lumOff val="0"/>
+                <a:alphaOff val="0"/>
+                <a:lumMod val="99000"/>
+                <a:satMod val="120000"/>
+                <a:shade val="78000"/>
+              </a:schemeClr>
+            </a:gs>
+          </a:gsLst>
+          <a:lin ang="5400000" scaled="0"/>
+        </a:gradFill>
+        <a:ln>
+          <a:noFill/>
+        </a:ln>
+        <a:effectLst/>
+        <a:scene3d>
+          <a:camera prst="orthographicFront"/>
+          <a:lightRig rig="threePt" dir="t">
+            <a:rot lat="0" lon="0" rev="7500000"/>
+          </a:lightRig>
+        </a:scene3d>
+        <a:sp3d prstMaterial="plastic">
+          <a:bevelT w="127000" h="25400" prst="relaxedInset"/>
+        </a:sp3d>
+      </dsp:spPr>
+      <dsp:style>
+        <a:lnRef idx="0">
+          <a:scrgbClr r="0" g="0" b="0"/>
+        </a:lnRef>
+        <a:fillRef idx="3">
+          <a:scrgbClr r="0" g="0" b="0"/>
+        </a:fillRef>
+        <a:effectRef idx="2">
+          <a:scrgbClr r="0" g="0" b="0"/>
+        </a:effectRef>
+        <a:fontRef idx="minor">
+          <a:schemeClr val="lt1"/>
+        </a:fontRef>
+      </dsp:style>
+      <dsp:txBody>
+        <a:bodyPr spcFirstLastPara="0" vert="horz" wrap="square" lIns="102870" tIns="102870" rIns="102870" bIns="102870" numCol="1" spcCol="1270" anchor="t" anchorCtr="0">
+          <a:noAutofit/>
+        </a:bodyPr>
+        <a:lstStyle/>
+        <a:p>
+          <a:pPr marL="0" lvl="0" indent="0" algn="ctr" defTabSz="1200150">
+            <a:lnSpc>
+              <a:spcPct val="90000"/>
+            </a:lnSpc>
+            <a:spcBef>
+              <a:spcPct val="0"/>
+            </a:spcBef>
+            <a:spcAft>
+              <a:spcPct val="35000"/>
+            </a:spcAft>
+            <a:buNone/>
+          </a:pPr>
+          <a:r>
+            <a:rPr lang="es-MX" sz="2700" kern="1200" dirty="0"/>
+            <a:t>Merge</a:t>
+          </a:r>
+        </a:p>
+        <a:p>
+          <a:pPr marL="228600" lvl="1" indent="-228600" algn="l" defTabSz="933450">
+            <a:lnSpc>
+              <a:spcPct val="90000"/>
+            </a:lnSpc>
+            <a:spcBef>
+              <a:spcPct val="0"/>
+            </a:spcBef>
+            <a:spcAft>
+              <a:spcPct val="15000"/>
+            </a:spcAft>
+            <a:buChar char="•"/>
+          </a:pPr>
+          <a:r>
+            <a:rPr lang="es-MX" sz="2100" kern="1200" dirty="0"/>
+            <a:t>git checkout develop</a:t>
+          </a:r>
+        </a:p>
+        <a:p>
+          <a:pPr marL="228600" lvl="1" indent="-228600" algn="l" defTabSz="933450">
+            <a:lnSpc>
+              <a:spcPct val="90000"/>
+            </a:lnSpc>
+            <a:spcBef>
+              <a:spcPct val="0"/>
+            </a:spcBef>
+            <a:spcAft>
+              <a:spcPct val="15000"/>
+            </a:spcAft>
+            <a:buChar char="•"/>
+          </a:pPr>
+          <a:r>
+            <a:rPr lang="es-MX" sz="2100" kern="1200" dirty="0"/>
+            <a:t>git pull</a:t>
+          </a:r>
+        </a:p>
+        <a:p>
+          <a:pPr marL="228600" lvl="1" indent="-228600" algn="l" defTabSz="933450">
+            <a:lnSpc>
+              <a:spcPct val="90000"/>
+            </a:lnSpc>
+            <a:spcBef>
+              <a:spcPct val="0"/>
+            </a:spcBef>
+            <a:spcAft>
+              <a:spcPct val="15000"/>
+            </a:spcAft>
+            <a:buChar char="•"/>
+          </a:pPr>
+          <a:r>
+            <a:rPr lang="es-MX" sz="2100" kern="1200" dirty="0"/>
+            <a:t>git merge “ramaOrigen”</a:t>
+          </a:r>
+        </a:p>
+        <a:p>
+          <a:pPr marL="228600" lvl="1" indent="-228600" algn="l" defTabSz="933450">
+            <a:lnSpc>
+              <a:spcPct val="90000"/>
+            </a:lnSpc>
+            <a:spcBef>
+              <a:spcPct val="0"/>
+            </a:spcBef>
+            <a:spcAft>
+              <a:spcPct val="15000"/>
+            </a:spcAft>
+            <a:buChar char="•"/>
+          </a:pPr>
+          <a:r>
+            <a:rPr lang="es-MX" sz="2100" kern="1200" dirty="0"/>
+            <a:t>git push</a:t>
+          </a:r>
+        </a:p>
+      </dsp:txBody>
+      <dsp:txXfrm>
+        <a:off x="112272" y="2775426"/>
+        <a:ext cx="3132797" cy="2075355"/>
+      </dsp:txXfrm>
+    </dsp:sp>
+    <dsp:sp modelId="{BFA6CBB0-3A3E-485A-A2AB-3552B7C03B7A}">
+      <dsp:nvSpPr>
+        <dsp:cNvPr id="0" name=""/>
+        <dsp:cNvSpPr/>
+      </dsp:nvSpPr>
+      <dsp:spPr>
+        <a:xfrm>
+          <a:off x="1594315" y="913762"/>
+          <a:ext cx="4643234" cy="4643234"/>
+        </a:xfrm>
+        <a:custGeom>
+          <a:avLst/>
+          <a:gdLst/>
+          <a:ahLst/>
+          <a:cxnLst/>
+          <a:rect l="0" t="0" r="0" b="0"/>
+          <a:pathLst>
+            <a:path>
+              <a:moveTo>
+                <a:pt x="243458" y="1286647"/>
+              </a:moveTo>
+              <a:arcTo wR="2321617" hR="2321617" stAng="12388460" swAng="2396742"/>
+            </a:path>
+          </a:pathLst>
+        </a:custGeom>
+        <a:noFill/>
+        <a:ln w="6350" cap="flat" cmpd="sng" algn="ctr">
+          <a:solidFill>
+            <a:schemeClr val="accent1">
+              <a:hueOff val="0"/>
+              <a:satOff val="0"/>
+              <a:lumOff val="0"/>
+              <a:alphaOff val="0"/>
+            </a:schemeClr>
+          </a:solidFill>
+          <a:prstDash val="solid"/>
+          <a:miter lim="800000"/>
+          <a:tailEnd type="arrow"/>
+        </a:ln>
+        <a:effectLst/>
+        <a:scene3d>
+          <a:camera prst="orthographicFront"/>
+          <a:lightRig rig="threePt" dir="t">
+            <a:rot lat="0" lon="0" rev="7500000"/>
+          </a:lightRig>
+        </a:scene3d>
+        <a:sp3d z="-40000" prstMaterial="matte"/>
+      </dsp:spPr>
+      <dsp:style>
+        <a:lnRef idx="1">
+          <a:scrgbClr r="0" g="0" b="0"/>
+        </a:lnRef>
+        <a:fillRef idx="0">
+          <a:scrgbClr r="0" g="0" b="0"/>
+        </a:fillRef>
+        <a:effectRef idx="0">
+          <a:scrgbClr r="0" g="0" b="0"/>
+        </a:effectRef>
+        <a:fontRef idx="minor"/>
+      </dsp:style>
+    </dsp:sp>
+  </dsp:spTree>
+</dsp:drawing>
+</file>
+
+<file path=ppt/diagrams/layout1.xml><?xml version="1.0" encoding="utf-8"?>
+<dgm:layoutDef xmlns:dgm="http://schemas.openxmlformats.org/drawingml/2006/diagram" xmlns:a="http://schemas.openxmlformats.org/drawingml/2006/main" uniqueId="urn:microsoft.com/office/officeart/2005/8/layout/cycle5">
+  <dgm:title val=""/>
+  <dgm:desc val=""/>
+  <dgm:catLst>
+    <dgm:cat type="cycle" pri="3000"/>
+  </dgm:catLst>
+  <dgm:sampData>
+    <dgm:dataModel>
+      <dgm:ptLst>
+        <dgm:pt modelId="0" type="doc"/>
+        <dgm:pt modelId="1">
+          <dgm:prSet phldr="1"/>
+        </dgm:pt>
+        <dgm:pt modelId="2">
+          <dgm:prSet phldr="1"/>
+        </dgm:pt>
+        <dgm:pt modelId="3">
+          <dgm:prSet phldr="1"/>
+        </dgm:pt>
+        <dgm:pt modelId="4">
+          <dgm:prSet phldr="1"/>
+        </dgm:pt>
+        <dgm:pt modelId="5">
+          <dgm:prSet phldr="1"/>
+        </dgm:pt>
+      </dgm:ptLst>
+      <dgm:cxnLst>
+        <dgm:cxn modelId="6" srcId="0" destId="1" srcOrd="0" destOrd="0"/>
+        <dgm:cxn modelId="7" srcId="0" destId="2" srcOrd="1" destOrd="0"/>
+        <dgm:cxn modelId="8" srcId="0" destId="3" srcOrd="2" destOrd="0"/>
+        <dgm:cxn modelId="9" srcId="0" destId="4" srcOrd="3" destOrd="0"/>
+        <dgm:cxn modelId="10" srcId="0" destId="5" srcOrd="4" destOrd="0"/>
+      </dgm:cxnLst>
+      <dgm:bg/>
+      <dgm:whole/>
+    </dgm:dataModel>
+  </dgm:sampData>
+  <dgm:styleData>
+    <dgm:dataModel>
+      <dgm:ptLst>
+        <dgm:pt modelId="0" type="doc"/>
+        <dgm:pt modelId="1"/>
+        <dgm:pt modelId="2"/>
+        <dgm:pt modelId="3"/>
+      </dgm:ptLst>
+      <dgm:cxnLst>
+        <dgm:cxn modelId="4" srcId="0" destId="1" srcOrd="0" destOrd="0"/>
+        <dgm:cxn modelId="5" srcId="0" destId="2" srcOrd="1" destOrd="0"/>
+        <dgm:cxn modelId="6" srcId="0" destId="3" srcOrd="2" destOrd="0"/>
+      </dgm:cxnLst>
+      <dgm:bg/>
+      <dgm:whole/>
+    </dgm:dataModel>
+  </dgm:styleData>
+  <dgm:clrData>
+    <dgm:dataModel>
+      <dgm:ptLst>
+        <dgm:pt modelId="0" type="doc"/>
+        <dgm:pt modelId="1"/>
+        <dgm:pt modelId="2"/>
+        <dgm:pt modelId="3"/>
+        <dgm:pt modelId="4"/>
+        <dgm:pt modelId="5"/>
+        <dgm:pt modelId="6"/>
+      </dgm:ptLst>
+      <dgm:cxnLst>
+        <dgm:cxn modelId="7" srcId="0" destId="1" srcOrd="0" destOrd="0"/>
+        <dgm:cxn modelId="8" srcId="0" destId="2" srcOrd="1" destOrd="0"/>
+        <dgm:cxn modelId="9" srcId="0" destId="3" srcOrd="2" destOrd="0"/>
+        <dgm:cxn modelId="10" srcId="0" destId="4" srcOrd="3" destOrd="0"/>
+        <dgm:cxn modelId="11" srcId="0" destId="5" srcOrd="4" destOrd="0"/>
+        <dgm:cxn modelId="12" srcId="0" destId="6" srcOrd="5" destOrd="0"/>
+      </dgm:cxnLst>
+      <dgm:bg/>
+      <dgm:whole/>
+    </dgm:dataModel>
+  </dgm:clrData>
+  <dgm:layoutNode name="cycle">
+    <dgm:varLst>
+      <dgm:dir/>
+      <dgm:resizeHandles val="exact"/>
+    </dgm:varLst>
+    <dgm:choose name="Name0">
+      <dgm:if name="Name1" func="var" arg="dir" op="equ" val="norm">
+        <dgm:choose name="Name2">
+          <dgm:if name="Name3" axis="ch" ptType="node" func="cnt" op="gt" val="2">
+            <dgm:alg type="cycle">
+              <dgm:param type="stAng" val="0"/>
+              <dgm:param type="spanAng" val="360"/>
+            </dgm:alg>
+          </dgm:if>
+          <dgm:else name="Name4">
+            <dgm:alg type="cycle">
+              <dgm:param type="stAng" val="-90"/>
+              <dgm:param type="spanAng" val="360"/>
+            </dgm:alg>
+          </dgm:else>
+        </dgm:choose>
+      </dgm:if>
+      <dgm:else name="Name5">
+        <dgm:choose name="Name6">
+          <dgm:if name="Name7" axis="ch" ptType="node" func="cnt" op="gt" val="2">
+            <dgm:alg type="cycle">
+              <dgm:param type="stAng" val="0"/>
+              <dgm:param type="spanAng" val="-360"/>
+            </dgm:alg>
+          </dgm:if>
+          <dgm:else name="Name8">
+            <dgm:alg type="cycle">
+              <dgm:param type="stAng" val="90"/>
+              <dgm:param type="spanAng" val="-360"/>
+            </dgm:alg>
+          </dgm:else>
+        </dgm:choose>
+      </dgm:else>
+    </dgm:choose>
+    <dgm:shape xmlns:r="http://schemas.openxmlformats.org/officeDocument/2006/relationships" r:blip="">
+      <dgm:adjLst/>
+    </dgm:shape>
+    <dgm:presOf/>
+    <dgm:choose name="Name9">
+      <dgm:if name="Name10" func="var" arg="dir" op="equ" val="norm">
+        <dgm:constrLst>
+          <dgm:constr type="w" for="ch" forName="node" refType="w"/>
+          <dgm:constr type="w" for="ch" ptType="sibTrans" refType="w" refFor="ch" refForName="node" op="equ" fact="0.3"/>
+          <dgm:constr type="diam" for="ch" ptType="sibTrans" refType="diam" op="equ"/>
+          <dgm:constr type="sibSp" refType="w" refFor="ch" refForName="node" op="equ" fact="0.15"/>
+          <dgm:constr type="w" for="ch" forName="spNode" refType="sibSp" fact="1.6"/>
+          <dgm:constr type="primFontSz" for="ch" forName="node" op="equ" val="65"/>
+        </dgm:constrLst>
+      </dgm:if>
+      <dgm:else name="Name11">
+        <dgm:constrLst>
+          <dgm:constr type="w" for="ch" forName="node" refType="w"/>
+          <dgm:constr type="w" for="ch" ptType="sibTrans" refType="w" refFor="ch" refForName="node" op="equ" fact="0.3"/>
+          <dgm:constr type="diam" for="ch" ptType="sibTrans" refType="diam" fact="-1"/>
+          <dgm:constr type="diam" for="ch" refType="diam" op="equ" fact="-1"/>
+          <dgm:constr type="sibSp" refType="w" refFor="ch" refForName="node" op="equ" fact="0.15"/>
+          <dgm:constr type="w" for="ch" forName="spNode" refType="sibSp" fact="1.6"/>
+          <dgm:constr type="primFontSz" for="ch" forName="node" op="equ" val="65"/>
+        </dgm:constrLst>
+      </dgm:else>
+    </dgm:choose>
+    <dgm:ruleLst/>
+    <dgm:forEach name="Name12" axis="ch" ptType="node">
+      <dgm:layoutNode name="node">
+        <dgm:varLst>
+          <dgm:bulletEnabled val="1"/>
+        </dgm:varLst>
+        <dgm:alg type="tx"/>
+        <dgm:shape xmlns:r="http://schemas.openxmlformats.org/officeDocument/2006/relationships" type="roundRect" r:blip="">
+          <dgm:adjLst/>
+        </dgm:shape>
+        <dgm:presOf axis="desOrSelf" ptType="node"/>
+        <dgm:constrLst>
+          <dgm:constr type="h" refType="w" fact="0.65"/>
+          <dgm:constr type="tMarg" refType="primFontSz" fact="0.3"/>
+          <dgm:constr type="bMarg" refType="primFontSz" fact="0.3"/>
+          <dgm:constr type="lMarg" refType="primFontSz" fact="0.3"/>
+          <dgm:constr type="rMarg" refType="primFontSz" fact="0.3"/>
+        </dgm:constrLst>
+        <dgm:ruleLst>
+          <dgm:rule type="primFontSz" val="5" fact="NaN" max="NaN"/>
+        </dgm:ruleLst>
+      </dgm:layoutNode>
+      <dgm:choose name="Name13">
+        <dgm:if name="Name14" axis="par ch" ptType="doc node" func="cnt" op="gt" val="1">
+          <dgm:layoutNode name="spNode">
+            <dgm:alg type="sp"/>
+            <dgm:shape xmlns:r="http://schemas.openxmlformats.org/officeDocument/2006/relationships" r:blip="">
+              <dgm:adjLst/>
+            </dgm:shape>
+            <dgm:presOf/>
+            <dgm:constrLst>
+              <dgm:constr type="h" refType="w"/>
+            </dgm:constrLst>
+            <dgm:ruleLst/>
+          </dgm:layoutNode>
+          <dgm:forEach name="Name15" axis="followSib" ptType="sibTrans" hideLastTrans="0" cnt="1">
+            <dgm:layoutNode name="sibTrans">
+              <dgm:alg type="conn">
+                <dgm:param type="dim" val="1D"/>
+                <dgm:param type="connRout" val="curve"/>
+                <dgm:param type="begPts" val="radial"/>
+                <dgm:param type="endPts" val="radial"/>
+              </dgm:alg>
+              <dgm:shape xmlns:r="http://schemas.openxmlformats.org/officeDocument/2006/relationships" type="conn" r:blip="">
+                <dgm:adjLst/>
+              </dgm:shape>
+              <dgm:presOf axis="self"/>
+              <dgm:constrLst>
+                <dgm:constr type="h" refType="w" fact="0.65"/>
+                <dgm:constr type="connDist"/>
+                <dgm:constr type="begPad" refType="connDist" fact="0.2"/>
+                <dgm:constr type="endPad" refType="connDist" fact="0.2"/>
+              </dgm:constrLst>
+              <dgm:ruleLst/>
+            </dgm:layoutNode>
+          </dgm:forEach>
+        </dgm:if>
+        <dgm:else name="Name16"/>
+      </dgm:choose>
+    </dgm:forEach>
+  </dgm:layoutNode>
+</dgm:layoutDef>
+</file>
+
+<file path=ppt/diagrams/quickStyle1.xml><?xml version="1.0" encoding="utf-8"?>
+<dgm:styleDef xmlns:dgm="http://schemas.openxmlformats.org/drawingml/2006/diagram" xmlns:a="http://schemas.openxmlformats.org/drawingml/2006/main" uniqueId="urn:microsoft.com/office/officeart/2005/8/quickstyle/3d2">
+  <dgm:title val=""/>
+  <dgm:desc val=""/>
+  <dgm:catLst>
+    <dgm:cat type="3D" pri="11200"/>
+  </dgm:catLst>
+  <dgm:scene3d>
+    <a:camera prst="orthographicFront"/>
+    <a:lightRig rig="threePt" dir="t"/>
+  </dgm:scene3d>
+  <dgm:styleLbl name="node0">
+    <dgm:scene3d>
+      <a:camera prst="orthographicFront"/>
+      <a:lightRig rig="threePt" dir="t">
+        <a:rot lat="0" lon="0" rev="7500000"/>
+      </a:lightRig>
+    </dgm:scene3d>
+    <dgm:sp3d prstMaterial="plastic">
+      <a:bevelT w="127000" h="25400" prst="relaxedInset"/>
+    </dgm:sp3d>
+    <dgm:txPr/>
+    <dgm:style>
+      <a:lnRef idx="0">
+        <a:scrgbClr r="0" g="0" b="0"/>
+      </a:lnRef>
+      <a:fillRef idx="3">
+        <a:scrgbClr r="0" g="0" b="0"/>
+      </a:fillRef>
+      <a:effectRef idx="2">
+        <a:scrgbClr r="0" g="0" b="0"/>
+      </a:effectRef>
+      <a:fontRef idx="minor">
+        <a:schemeClr val="lt1"/>
+      </a:fontRef>
+    </dgm:style>
+  </dgm:styleLbl>
+  <dgm:styleLbl name="lnNode1">
+    <dgm:scene3d>
+      <a:camera prst="orthographicFront"/>
+      <a:lightRig rig="threePt" dir="t">
+        <a:rot lat="0" lon="0" rev="7500000"/>
+      </a:lightRig>
+    </dgm:scene3d>
+    <dgm:sp3d prstMaterial="plastic">
+      <a:bevelT w="127000" h="25400" prst="relaxedInset"/>
+    </dgm:sp3d>
+    <dgm:txPr/>
+    <dgm:style>
+      <a:lnRef idx="1">
+        <a:scrgbClr r="0" g="0" b="0"/>
+      </a:lnRef>
+      <a:fillRef idx="3">
+        <a:scrgbClr r="0" g="0" b="0"/>
+      </a:fillRef>
+      <a:effectRef idx="2">
+        <a:scrgbClr r="0" g="0" b="0"/>
+      </a:effectRef>
+      <a:fontRef idx="minor">
+        <a:schemeClr val="lt1"/>
+      </a:fontRef>
+    </dgm:style>
+  </dgm:styleLbl>
+  <dgm:styleLbl name="vennNode1">
+    <dgm:scene3d>
+      <a:camera prst="orthographicFront"/>
+      <a:lightRig rig="threePt" dir="t">
+        <a:rot lat="0" lon="0" rev="7500000"/>
+      </a:lightRig>
+    </dgm:scene3d>
+    <dgm:sp3d prstMaterial="plastic">
+      <a:bevelT w="127000" h="25400" prst="relaxedInset"/>
+    </dgm:sp3d>
+    <dgm:txPr/>
+    <dgm:style>
+      <a:lnRef idx="0">
+        <a:scrgbClr r="0" g="0" b="0"/>
+      </a:lnRef>
+      <a:fillRef idx="3">
+        <a:scrgbClr r="0" g="0" b="0"/>
+      </a:fillRef>
+      <a:effectRef idx="2">
+        <a:scrgbClr r="0" g="0" b="0"/>
+      </a:effectRef>
+      <a:fontRef idx="minor">
+        <a:schemeClr val="tx1"/>
+      </a:fontRef>
+    </dgm:style>
+  </dgm:styleLbl>
+  <dgm:styleLbl name="alingNode1">
+    <dgm:scene3d>
+      <a:camera prst="orthographicFront"/>
+      <a:lightRig rig="threePt" dir="t">
+        <a:rot lat="0" lon="0" rev="7500000"/>
+      </a:lightRig>
+    </dgm:scene3d>
+    <dgm:sp3d prstMaterial="plastic">
+      <a:bevelT w="127000" h="25400" prst="relaxedInset"/>
+    </dgm:sp3d>
+    <dgm:txPr/>
+    <dgm:style>
+      <a:lnRef idx="0">
+        <a:scrgbClr r="0" g="0" b="0"/>
+      </a:lnRef>
+      <a:fillRef idx="3">
+        <a:scrgbClr r="0" g="0" b="0"/>
+      </a:fillRef>
+      <a:effectRef idx="2">
+        <a:scrgbClr r="0" g="0" b="0"/>
+      </a:effectRef>
+      <a:fontRef idx="minor">
+        <a:schemeClr val="lt1"/>
+      </a:fontRef>
+    </dgm:style>
+  </dgm:styleLbl>
+  <dgm:styleLbl name="node1">
+    <dgm:scene3d>
+      <a:camera prst="orthographicFront"/>
+      <a:lightRig rig="threePt" dir="t">
+        <a:rot lat="0" lon="0" rev="7500000"/>
+      </a:lightRig>
+    </dgm:scene3d>
+    <dgm:sp3d prstMaterial="plastic">
+      <a:bevelT w="127000" h="25400" prst="relaxedInset"/>
+    </dgm:sp3d>
+    <dgm:txPr/>
+    <dgm:style>
+      <a:lnRef idx="0">
+        <a:scrgbClr r="0" g="0" b="0"/>
+      </a:lnRef>
+      <a:fillRef idx="3">
+        <a:scrgbClr r="0" g="0" b="0"/>
+      </a:fillRef>
+      <a:effectRef idx="2">
+        <a:scrgbClr r="0" g="0" b="0"/>
+      </a:effectRef>
+      <a:fontRef idx="minor">
+        <a:schemeClr val="lt1"/>
+      </a:fontRef>
+    </dgm:style>
+  </dgm:styleLbl>
+  <dgm:styleLbl name="node2">
+    <dgm:scene3d>
+      <a:camera prst="orthographicFront"/>
+      <a:lightRig rig="threePt" dir="t">
+        <a:rot lat="0" lon="0" rev="7500000"/>
+      </a:lightRig>
+    </dgm:scene3d>
+    <dgm:sp3d prstMaterial="plastic">
+      <a:bevelT w="127000" h="25400" prst="relaxedInset"/>
+    </dgm:sp3d>
+    <dgm:txPr/>
+    <dgm:style>
+      <a:lnRef idx="0">
+        <a:scrgbClr r="0" g="0" b="0"/>
+      </a:lnRef>
+      <a:fillRef idx="3">
+        <a:scrgbClr r="0" g="0" b="0"/>
+      </a:fillRef>
+      <a:effectRef idx="2">
+        <a:scrgbClr r="0" g="0" b="0"/>
+      </a:effectRef>
+      <a:fontRef idx="minor">
+        <a:schemeClr val="lt1"/>
+      </a:fontRef>
+    </dgm:style>
+  </dgm:styleLbl>
+  <dgm:styleLbl name="node3">
+    <dgm:scene3d>
+      <a:camera prst="orthographicFront"/>
+      <a:lightRig rig="threePt" dir="t">
+        <a:rot lat="0" lon="0" rev="7500000"/>
+      </a:lightRig>
+    </dgm:scene3d>
+    <dgm:sp3d prstMaterial="plastic">
+      <a:bevelT w="127000" h="25400" prst="relaxedInset"/>
+    </dgm:sp3d>
+    <dgm:txPr/>
+    <dgm:style>
+      <a:lnRef idx="0">
+        <a:scrgbClr r="0" g="0" b="0"/>
+      </a:lnRef>
+      <a:fillRef idx="3">
+        <a:scrgbClr r="0" g="0" b="0"/>
+      </a:fillRef>
+      <a:effectRef idx="2">
+        <a:scrgbClr r="0" g="0" b="0"/>
+      </a:effectRef>
+      <a:fontRef idx="minor">
+        <a:schemeClr val="lt1"/>
+      </a:fontRef>
+    </dgm:style>
+  </dgm:styleLbl>
+  <dgm:styleLbl name="node4">
+    <dgm:scene3d>
+      <a:camera prst="orthographicFront"/>
+      <a:lightRig rig="threePt" dir="t">
+        <a:rot lat="0" lon="0" rev="7500000"/>
+      </a:lightRig>
+    </dgm:scene3d>
+    <dgm:sp3d prstMaterial="plastic">
+      <a:bevelT w="127000" h="25400" prst="relaxedInset"/>
+    </dgm:sp3d>
+    <dgm:txPr/>
+    <dgm:style>
+      <a:lnRef idx="0">
+        <a:scrgbClr r="0" g="0" b="0"/>
+      </a:lnRef>
+      <a:fillRef idx="3">
+        <a:scrgbClr r="0" g="0" b="0"/>
+      </a:fillRef>
+      <a:effectRef idx="2">
+        <a:scrgbClr r="0" g="0" b="0"/>
+      </a:effectRef>
+      <a:fontRef idx="minor">
+        <a:schemeClr val="lt1"/>
+      </a:fontRef>
+    </dgm:style>
+  </dgm:styleLbl>
+  <dgm:styleLbl name="fgImgPlace1">
+    <dgm:scene3d>
+      <a:camera prst="orthographicFront"/>
+      <a:lightRig rig="threePt" dir="t">
+        <a:rot lat="0" lon="0" rev="7500000"/>
+      </a:lightRig>
+    </dgm:scene3d>
+    <dgm:sp3d z="152400" extrusionH="63500" prstMaterial="matte">
+      <a:bevelT w="50800" h="19050" prst="relaxedInset"/>
+      <a:contourClr>
+        <a:schemeClr val="bg1"/>
+      </a:contourClr>
+    </dgm:sp3d>
+    <dgm:txPr/>
+    <dgm:style>
+      <a:lnRef idx="0">
+        <a:scrgbClr r="0" g="0" b="0"/>
+      </a:lnRef>
+      <a:fillRef idx="1">
+        <a:scrgbClr r="0" g="0" b="0"/>
+      </a:fillRef>
+      <a:effectRef idx="0">
+        <a:scrgbClr r="0" g="0" b="0"/>
+      </a:effectRef>
+      <a:fontRef idx="minor"/>
+    </dgm:style>
+  </dgm:styleLbl>
+  <dgm:styleLbl name="alignImgPlace1">
+    <dgm:scene3d>
+      <a:camera prst="orthographicFront"/>
+      <a:lightRig rig="threePt" dir="t">
+        <a:rot lat="0" lon="0" rev="7500000"/>
+      </a:lightRig>
+    </dgm:scene3d>
+    <dgm:sp3d z="254000" extrusionH="63500" contourW="12700" prstMaterial="matte">
+      <a:contourClr>
+        <a:schemeClr val="lt1"/>
+      </a:contourClr>
+    </dgm:sp3d>
+    <dgm:txPr/>
+    <dgm:style>
+      <a:lnRef idx="0">
+        <a:scrgbClr r="0" g="0" b="0"/>
+      </a:lnRef>
+      <a:fillRef idx="1">
+        <a:scrgbClr r="0" g="0" b="0"/>
+      </a:fillRef>
+      <a:effectRef idx="0">
+        <a:scrgbClr r="0" g="0" b="0"/>
+      </a:effectRef>
+      <a:fontRef idx="minor"/>
+    </dgm:style>
+  </dgm:styleLbl>
+  <dgm:styleLbl name="bgImgPlace1">
+    <dgm:scene3d>
+      <a:camera prst="orthographicFront"/>
+      <a:lightRig rig="threePt" dir="t">
+        <a:rot lat="0" lon="0" rev="7500000"/>
+      </a:lightRig>
+    </dgm:scene3d>
+    <dgm:sp3d z="-152400" extrusionH="63500" contourW="12700" prstMaterial="matte">
+      <a:contourClr>
+        <a:schemeClr val="lt1"/>
+      </a:contourClr>
+    </dgm:sp3d>
+    <dgm:txPr/>
+    <dgm:style>
+      <a:lnRef idx="0">
+        <a:scrgbClr r="0" g="0" b="0"/>
+      </a:lnRef>
+      <a:fillRef idx="1">
+        <a:scrgbClr r="0" g="0" b="0"/>
+      </a:fillRef>
+      <a:effectRef idx="0">
+        <a:scrgbClr r="0" g="0" b="0"/>
+      </a:effectRef>
+      <a:fontRef idx="minor"/>
+    </dgm:style>
+  </dgm:styleLbl>
+  <dgm:styleLbl name="sibTrans2D1">
+    <dgm:scene3d>
+      <a:camera prst="orthographicFront"/>
+      <a:lightRig rig="threePt" dir="t">
+        <a:rot lat="0" lon="0" rev="7500000"/>
+      </a:lightRig>
+    </dgm:scene3d>
+    <dgm:sp3d z="-70000" extrusionH="63500" prstMaterial="matte">
+      <a:bevelT w="25400" h="6350" prst="relaxedInset"/>
+      <a:contourClr>
+        <a:schemeClr val="bg1"/>
+      </a:contourClr>
+    </dgm:sp3d>
+    <dgm:txPr/>
+    <dgm:style>
+      <a:lnRef idx="0">
+        <a:scrgbClr r="0" g="0" b="0"/>
+      </a:lnRef>
+      <a:fillRef idx="1">
+        <a:scrgbClr r="0" g="0" b="0"/>
+      </a:fillRef>
+      <a:effectRef idx="2">
+        <a:scrgbClr r="0" g="0" b="0"/>
+      </a:effectRef>
+      <a:fontRef idx="minor">
+        <a:schemeClr val="lt1"/>
+      </a:fontRef>
+    </dgm:style>
+  </dgm:styleLbl>
+  <dgm:styleLbl name="fgSibTrans2D1">
+    <dgm:scene3d>
+      <a:camera prst="orthographicFront"/>
+      <a:lightRig rig="threePt" dir="t">
+        <a:rot lat="0" lon="0" rev="7500000"/>
+      </a:lightRig>
+    </dgm:scene3d>
+    <dgm:sp3d z="152400" extrusionH="63500" prstMaterial="matte">
+      <a:bevelT w="25400" h="6350" prst="relaxedInset"/>
+      <a:contourClr>
+        <a:schemeClr val="bg1"/>
+      </a:contourClr>
+    </dgm:sp3d>
+    <dgm:txPr/>
+    <dgm:style>
+      <a:lnRef idx="0">
+        <a:scrgbClr r="0" g="0" b="0"/>
+      </a:lnRef>
+      <a:fillRef idx="1">
+        <a:scrgbClr r="0" g="0" b="0"/>
+      </a:fillRef>
+      <a:effectRef idx="2">
+        <a:scrgbClr r="0" g="0" b="0"/>
+      </a:effectRef>
+      <a:fontRef idx="minor">
+        <a:schemeClr val="lt1"/>
+      </a:fontRef>
+    </dgm:style>
+  </dgm:styleLbl>
+  <dgm:styleLbl name="bgSibTrans2D1">
+    <dgm:scene3d>
+      <a:camera prst="orthographicFront"/>
+      <a:lightRig rig="threePt" dir="t">
+        <a:rot lat="0" lon="0" rev="7500000"/>
+      </a:lightRig>
+    </dgm:scene3d>
+    <dgm:sp3d z="-152400" extrusionH="63500" prstMaterial="matte">
+      <a:bevelT w="25400" h="6350" prst="relaxedInset"/>
+      <a:contourClr>
+        <a:schemeClr val="bg1"/>
+      </a:contourClr>
+    </dgm:sp3d>
+    <dgm:txPr/>
+    <dgm:style>
+      <a:lnRef idx="0">
+        <a:scrgbClr r="0" g="0" b="0"/>
+      </a:lnRef>
+      <a:fillRef idx="1">
+        <a:scrgbClr r="0" g="0" b="0"/>
+      </a:fillRef>
+      <a:effectRef idx="2">
+        <a:scrgbClr r="0" g="0" b="0"/>
+      </a:effectRef>
+      <a:fontRef idx="minor">
+        <a:schemeClr val="lt1"/>
+      </a:fontRef>
+    </dgm:style>
+  </dgm:styleLbl>
+  <dgm:styleLbl name="sibTrans1D1">
+    <dgm:scene3d>
+      <a:camera prst="orthographicFront"/>
+      <a:lightRig rig="threePt" dir="t">
+        <a:rot lat="0" lon="0" rev="7500000"/>
+      </a:lightRig>
+    </dgm:scene3d>
+    <dgm:sp3d z="-40000" prstMaterial="matte"/>
+    <dgm:txPr/>
+    <dgm:style>
+      <a:lnRef idx="1">
+        <a:scrgbClr r="0" g="0" b="0"/>
+      </a:lnRef>
+      <a:fillRef idx="0">
+        <a:scrgbClr r="0" g="0" b="0"/>
+      </a:fillRef>
+      <a:effectRef idx="0">
+        <a:scrgbClr r="0" g="0" b="0"/>
+      </a:effectRef>
+      <a:fontRef idx="minor"/>
+    </dgm:style>
+  </dgm:styleLbl>
+  <dgm:styleLbl name="callout">
+    <dgm:scene3d>
+      <a:camera prst="orthographicFront"/>
+      <a:lightRig rig="threePt" dir="t">
+        <a:rot lat="0" lon="0" rev="7500000"/>
+      </a:lightRig>
+    </dgm:scene3d>
+    <dgm:sp3d z="127000" prstMaterial="matte"/>
+    <dgm:txPr/>
+    <dgm:style>
+      <a:lnRef idx="2">
+        <a:scrgbClr r="0" g="0" b="0"/>
+      </a:lnRef>
+      <a:fillRef idx="1">
+        <a:scrgbClr r="0" g="0" b="0"/>
+      </a:fillRef>
+      <a:effectRef idx="0">
+        <a:scrgbClr r="0" g="0" b="0"/>
+      </a:effectRef>
+      <a:fontRef idx="minor"/>
+    </dgm:style>
+  </dgm:styleLbl>
+  <dgm:styleLbl name="asst0">
+    <dgm:scene3d>
+      <a:camera prst="orthographicFront"/>
+      <a:lightRig rig="threePt" dir="t">
+        <a:rot lat="0" lon="0" rev="7500000"/>
+      </a:lightRig>
+    </dgm:scene3d>
+    <dgm:sp3d prstMaterial="plastic">
+      <a:bevelT w="127000" h="25400" prst="relaxedInset"/>
+    </dgm:sp3d>
+    <dgm:txPr/>
+    <dgm:style>
+      <a:lnRef idx="0">
+        <a:scrgbClr r="0" g="0" b="0"/>
+      </a:lnRef>
+      <a:fillRef idx="3">
+        <a:scrgbClr r="0" g="0" b="0"/>
+      </a:fillRef>
+      <a:effectRef idx="2">
+        <a:scrgbClr r="0" g="0" b="0"/>
+      </a:effectRef>
+      <a:fontRef idx="minor">
+        <a:schemeClr val="lt1"/>
+      </a:fontRef>
+    </dgm:style>
+  </dgm:styleLbl>
+  <dgm:styleLbl name="asst1">
+    <dgm:scene3d>
+      <a:camera prst="orthographicFront"/>
+      <a:lightRig rig="threePt" dir="t">
+        <a:rot lat="0" lon="0" rev="7500000"/>
+      </a:lightRig>
+    </dgm:scene3d>
+    <dgm:sp3d prstMaterial="plastic">
+      <a:bevelT w="127000" h="25400" prst="relaxedInset"/>
+    </dgm:sp3d>
+    <dgm:txPr/>
+    <dgm:style>
+      <a:lnRef idx="0">
+        <a:scrgbClr r="0" g="0" b="0"/>
+      </a:lnRef>
+      <a:fillRef idx="3">
+        <a:scrgbClr r="0" g="0" b="0"/>
+      </a:fillRef>
+      <a:effectRef idx="2">
+        <a:scrgbClr r="0" g="0" b="0"/>
+      </a:effectRef>
+      <a:fontRef idx="minor">
+        <a:schemeClr val="lt1"/>
+      </a:fontRef>
+    </dgm:style>
+  </dgm:styleLbl>
+  <dgm:styleLbl name="asst2">
+    <dgm:scene3d>
+      <a:camera prst="orthographicFront"/>
+      <a:lightRig rig="threePt" dir="t">
+        <a:rot lat="0" lon="0" rev="7500000"/>
+      </a:lightRig>
+    </dgm:scene3d>
+    <dgm:sp3d prstMaterial="plastic">
+      <a:bevelT w="127000" h="25400" prst="relaxedInset"/>
+    </dgm:sp3d>
+    <dgm:txPr/>
+    <dgm:style>
+      <a:lnRef idx="0">
+        <a:scrgbClr r="0" g="0" b="0"/>
+      </a:lnRef>
+      <a:fillRef idx="3">
+        <a:scrgbClr r="0" g="0" b="0"/>
+      </a:fillRef>
+      <a:effectRef idx="2">
+        <a:scrgbClr r="0" g="0" b="0"/>
+      </a:effectRef>
+      <a:fontRef idx="minor">
+        <a:schemeClr val="lt1"/>
+      </a:fontRef>
+    </dgm:style>
+  </dgm:styleLbl>
+  <dgm:styleLbl name="asst3">
+    <dgm:scene3d>
+      <a:camera prst="orthographicFront"/>
+      <a:lightRig rig="threePt" dir="t">
+        <a:rot lat="0" lon="0" rev="7500000"/>
+      </a:lightRig>
+    </dgm:scene3d>
+    <dgm:sp3d prstMaterial="plastic">
+      <a:bevelT w="127000" h="25400" prst="relaxedInset"/>
+    </dgm:sp3d>
+    <dgm:txPr/>
+    <dgm:style>
+      <a:lnRef idx="0">
+        <a:scrgbClr r="0" g="0" b="0"/>
+      </a:lnRef>
+      <a:fillRef idx="3">
+        <a:scrgbClr r="0" g="0" b="0"/>
+      </a:fillRef>
+      <a:effectRef idx="2">
+        <a:scrgbClr r="0" g="0" b="0"/>
+      </a:effectRef>
+      <a:fontRef idx="minor">
+        <a:schemeClr val="lt1"/>
+      </a:fontRef>
+    </dgm:style>
+  </dgm:styleLbl>
+  <dgm:styleLbl name="parChTrans2D1">
+    <dgm:scene3d>
+      <a:camera prst="orthographicFront"/>
+      <a:lightRig rig="threePt" dir="t">
+        <a:rot lat="0" lon="0" rev="7500000"/>
+      </a:lightRig>
+    </dgm:scene3d>
+    <dgm:sp3d extrusionH="63500" prstMaterial="matte">
+      <a:bevelT w="50800" h="19050" prst="relaxedInset"/>
+      <a:contourClr>
+        <a:schemeClr val="bg1"/>
+      </a:contourClr>
+    </dgm:sp3d>
+    <dgm:txPr/>
+    <dgm:style>
+      <a:lnRef idx="0">
+        <a:scrgbClr r="0" g="0" b="0"/>
+      </a:lnRef>
+      <a:fillRef idx="1">
+        <a:scrgbClr r="0" g="0" b="0"/>
+      </a:fillRef>
+      <a:effectRef idx="2">
+        <a:scrgbClr r="0" g="0" b="0"/>
+      </a:effectRef>
+      <a:fontRef idx="minor">
+        <a:schemeClr val="lt1"/>
+      </a:fontRef>
+    </dgm:style>
+  </dgm:styleLbl>
+  <dgm:styleLbl name="parChTrans2D2">
+    <dgm:scene3d>
+      <a:camera prst="orthographicFront"/>
+      <a:lightRig rig="threePt" dir="t">
+        <a:rot lat="0" lon="0" rev="7500000"/>
+      </a:lightRig>
+    </dgm:scene3d>
+    <dgm:sp3d extrusionH="63500" prstMaterial="matte">
+      <a:bevelT w="50800" h="19050" prst="relaxedInset"/>
+      <a:contourClr>
+        <a:schemeClr val="bg1"/>
+      </a:contourClr>
+    </dgm:sp3d>
+    <dgm:txPr/>
+    <dgm:style>
+      <a:lnRef idx="0">
+        <a:scrgbClr r="0" g="0" b="0"/>
+      </a:lnRef>
+      <a:fillRef idx="1">
+        <a:scrgbClr r="0" g="0" b="0"/>
+      </a:fillRef>
+      <a:effectRef idx="0">
+        <a:scrgbClr r="0" g="0" b="0"/>
+      </a:effectRef>
+      <a:fontRef idx="minor">
+        <a:schemeClr val="lt1"/>
+      </a:fontRef>
+    </dgm:style>
+  </dgm:styleLbl>
+  <dgm:styleLbl name="parChTrans2D3">
+    <dgm:scene3d>
+      <a:camera prst="orthographicFront"/>
+      <a:lightRig rig="threePt" dir="t">
+        <a:rot lat="0" lon="0" rev="7500000"/>
+      </a:lightRig>
+    </dgm:scene3d>
+    <dgm:sp3d z="60000" prstMaterial="flat">
+      <a:bevelT w="120900" h="88900"/>
+    </dgm:sp3d>
+    <dgm:txPr/>
+    <dgm:style>
+      <a:lnRef idx="0">
+        <a:scrgbClr r="0" g="0" b="0"/>
+      </a:lnRef>
+      <a:fillRef idx="3">
+        <a:scrgbClr r="0" g="0" b="0"/>
+      </a:fillRef>
+      <a:effectRef idx="1">
+        <a:scrgbClr r="0" g="0" b="0"/>
+      </a:effectRef>
+      <a:fontRef idx="minor">
+        <a:schemeClr val="lt1"/>
+      </a:fontRef>
+    </dgm:style>
+  </dgm:styleLbl>
+  <dgm:styleLbl name="parChTrans2D4">
+    <dgm:scene3d>
+      <a:camera prst="orthographicFront"/>
+      <a:lightRig rig="threePt" dir="t">
+        <a:rot lat="0" lon="0" rev="7500000"/>
+      </a:lightRig>
+    </dgm:scene3d>
+    <dgm:sp3d z="60000" prstMaterial="flat">
+      <a:bevelT w="120900" h="88900"/>
+    </dgm:sp3d>
+    <dgm:txPr/>
+    <dgm:style>
+      <a:lnRef idx="0">
+        <a:scrgbClr r="0" g="0" b="0"/>
+      </a:lnRef>
+      <a:fillRef idx="3">
+        <a:scrgbClr r="0" g="0" b="0"/>
+      </a:fillRef>
+      <a:effectRef idx="1">
+        <a:scrgbClr r="0" g="0" b="0"/>
+      </a:effectRef>
+      <a:fontRef idx="minor">
+        <a:schemeClr val="lt1"/>
+      </a:fontRef>
+    </dgm:style>
+  </dgm:styleLbl>
+  <dgm:styleLbl name="parChTrans1D1">
+    <dgm:scene3d>
+      <a:camera prst="orthographicFront"/>
+      <a:lightRig rig="threePt" dir="t">
+        <a:rot lat="0" lon="0" rev="7500000"/>
+      </a:lightRig>
+    </dgm:scene3d>
+    <dgm:sp3d z="-40000" prstMaterial="matte"/>
+    <dgm:txPr/>
+    <dgm:style>
+      <a:lnRef idx="2">
+        <a:scrgbClr r="0" g="0" b="0"/>
+      </a:lnRef>
+      <a:fillRef idx="0">
+        <a:scrgbClr r="0" g="0" b="0"/>
+      </a:fillRef>
+      <a:effectRef idx="0">
+        <a:scrgbClr r="0" g="0" b="0"/>
+      </a:effectRef>
+      <a:fontRef idx="minor"/>
+    </dgm:style>
+  </dgm:styleLbl>
+  <dgm:styleLbl name="parChTrans1D2">
+    <dgm:scene3d>
+      <a:camera prst="orthographicFront"/>
+      <a:lightRig rig="threePt" dir="t">
+        <a:rot lat="0" lon="0" rev="7500000"/>
+      </a:lightRig>
+    </dgm:scene3d>
+    <dgm:sp3d z="-40000" prstMaterial="matte"/>
+    <dgm:txPr/>
+    <dgm:style>
+      <a:lnRef idx="2">
+        <a:scrgbClr r="0" g="0" b="0"/>
+      </a:lnRef>
+      <a:fillRef idx="0">
+        <a:scrgbClr r="0" g="0" b="0"/>
+      </a:fillRef>
+      <a:effectRef idx="0">
+        <a:scrgbClr r="0" g="0" b="0"/>
+      </a:effectRef>
+      <a:fontRef idx="minor"/>
+    </dgm:style>
+  </dgm:styleLbl>
+  <dgm:styleLbl name="parChTrans1D3">
+    <dgm:scene3d>
+      <a:camera prst="orthographicFront"/>
+      <a:lightRig rig="threePt" dir="t">
+        <a:rot lat="0" lon="0" rev="7500000"/>
+      </a:lightRig>
+    </dgm:scene3d>
+    <dgm:sp3d z="-40000" prstMaterial="matte"/>
+    <dgm:txPr/>
+    <dgm:style>
+      <a:lnRef idx="2">
+        <a:scrgbClr r="0" g="0" b="0"/>
+      </a:lnRef>
+      <a:fillRef idx="0">
+        <a:scrgbClr r="0" g="0" b="0"/>
+      </a:fillRef>
+      <a:effectRef idx="0">
+        <a:scrgbClr r="0" g="0" b="0"/>
+      </a:effectRef>
+      <a:fontRef idx="minor"/>
+    </dgm:style>
+  </dgm:styleLbl>
+  <dgm:styleLbl name="parChTrans1D4">
+    <dgm:scene3d>
+      <a:camera prst="orthographicFront"/>
+      <a:lightRig rig="threePt" dir="t">
+        <a:rot lat="0" lon="0" rev="7500000"/>
+      </a:lightRig>
+    </dgm:scene3d>
+    <dgm:sp3d z="-40000" prstMaterial="matte"/>
+    <dgm:txPr/>
+    <dgm:style>
+      <a:lnRef idx="2">
+        <a:scrgbClr r="0" g="0" b="0"/>
+      </a:lnRef>
+      <a:fillRef idx="0">
+        <a:scrgbClr r="0" g="0" b="0"/>
+      </a:fillRef>
+      <a:effectRef idx="0">
+        <a:scrgbClr r="0" g="0" b="0"/>
+      </a:effectRef>
+      <a:fontRef idx="minor"/>
+    </dgm:style>
+  </dgm:styleLbl>
+  <dgm:styleLbl name="fgAcc1">
+    <dgm:scene3d>
+      <a:camera prst="orthographicFront"/>
+      <a:lightRig rig="threePt" dir="t">
+        <a:rot lat="0" lon="0" rev="7500000"/>
+      </a:lightRig>
+    </dgm:scene3d>
+    <dgm:sp3d z="152400" extrusionH="63500" prstMaterial="dkEdge">
+      <a:bevelT w="135400" h="16350" prst="relaxedInset"/>
+      <a:contourClr>
+        <a:schemeClr val="bg1"/>
+      </a:contourClr>
+    </dgm:sp3d>
+    <dgm:txPr/>
+    <dgm:style>
+      <a:lnRef idx="1">
+        <a:scrgbClr r="0" g="0" b="0"/>
+      </a:lnRef>
+      <a:fillRef idx="1">
+        <a:scrgbClr r="0" g="0" b="0"/>
+      </a:fillRef>
+      <a:effectRef idx="2">
+        <a:scrgbClr r="0" g="0" b="0"/>
+      </a:effectRef>
+      <a:fontRef idx="minor"/>
+    </dgm:style>
+  </dgm:styleLbl>
+  <dgm:styleLbl name="conFgAcc1">
+    <dgm:scene3d>
+      <a:camera prst="orthographicFront"/>
+      <a:lightRig rig="threePt" dir="t">
+        <a:rot lat="0" lon="0" rev="7500000"/>
+      </a:lightRig>
+    </dgm:scene3d>
+    <dgm:sp3d z="152400" extrusionH="63500" prstMaterial="dkEdge">
+      <a:bevelT w="135400" h="16350" prst="relaxedInset"/>
+      <a:contourClr>
+        <a:schemeClr val="bg1"/>
+      </a:contourClr>
+    </dgm:sp3d>
+    <dgm:txPr/>
+    <dgm:style>
+      <a:lnRef idx="1">
+        <a:scrgbClr r="0" g="0" b="0"/>
+      </a:lnRef>
+      <a:fillRef idx="1">
+        <a:scrgbClr r="0" g="0" b="0"/>
+      </a:fillRef>
+      <a:effectRef idx="2">
+        <a:scrgbClr r="0" g="0" b="0"/>
+      </a:effectRef>
+      <a:fontRef idx="minor"/>
+    </dgm:style>
+  </dgm:styleLbl>
+  <dgm:styleLbl name="alignAcc1">
+    <dgm:scene3d>
+      <a:camera prst="orthographicFront"/>
+      <a:lightRig rig="threePt" dir="t">
+        <a:rot lat="0" lon="0" rev="7500000"/>
+      </a:lightRig>
+    </dgm:scene3d>
+    <dgm:sp3d extrusionH="190500" prstMaterial="dkEdge">
+      <a:bevelT w="135400" h="16350" prst="relaxedInset"/>
+      <a:contourClr>
+        <a:schemeClr val="bg1"/>
+      </a:contourClr>
+    </dgm:sp3d>
+    <dgm:txPr/>
+    <dgm:style>
+      <a:lnRef idx="1">
+        <a:scrgbClr r="0" g="0" b="0"/>
+      </a:lnRef>
+      <a:fillRef idx="1">
+        <a:scrgbClr r="0" g="0" b="0"/>
+      </a:fillRef>
+      <a:effectRef idx="2">
+        <a:scrgbClr r="0" g="0" b="0"/>
+      </a:effectRef>
+      <a:fontRef idx="minor"/>
+    </dgm:style>
+  </dgm:styleLbl>
+  <dgm:styleLbl name="trAlignAcc1">
+    <dgm:scene3d>
+      <a:camera prst="orthographicFront"/>
+      <a:lightRig rig="threePt" dir="t">
+        <a:rot lat="0" lon="0" rev="7500000"/>
+      </a:lightRig>
+    </dgm:scene3d>
+    <dgm:sp3d prstMaterial="plastic">
+      <a:bevelT w="127000" h="35400"/>
+    </dgm:sp3d>
+    <dgm:txPr/>
+    <dgm:style>
+      <a:lnRef idx="1">
+        <a:scrgbClr r="0" g="0" b="0"/>
+      </a:lnRef>
+      <a:fillRef idx="1">
+        <a:scrgbClr r="0" g="0" b="0"/>
+      </a:fillRef>
+      <a:effectRef idx="2">
+        <a:scrgbClr r="0" g="0" b="0"/>
+      </a:effectRef>
+      <a:fontRef idx="minor">
+        <a:schemeClr val="lt1"/>
+      </a:fontRef>
+    </dgm:style>
+  </dgm:styleLbl>
+  <dgm:styleLbl name="bgAcc1">
+    <dgm:scene3d>
+      <a:camera prst="orthographicFront"/>
+      <a:lightRig rig="threePt" dir="t">
+        <a:rot lat="0" lon="0" rev="7500000"/>
+      </a:lightRig>
+    </dgm:scene3d>
+    <dgm:sp3d z="-152400" extrusionH="63500" prstMaterial="dkEdge">
+      <a:bevelT w="124450" h="16350" prst="relaxedInset"/>
+      <a:contourClr>
+        <a:schemeClr val="bg1"/>
+      </a:contourClr>
+    </dgm:sp3d>
+    <dgm:txPr/>
+    <dgm:style>
+      <a:lnRef idx="1">
+        <a:scrgbClr r="0" g="0" b="0"/>
+      </a:lnRef>
+      <a:fillRef idx="1">
+        <a:scrgbClr r="0" g="0" b="0"/>
+      </a:fillRef>
+      <a:effectRef idx="0">
+        <a:scrgbClr r="0" g="0" b="0"/>
+      </a:effectRef>
+      <a:fontRef idx="minor"/>
+    </dgm:style>
+  </dgm:styleLbl>
+  <dgm:styleLbl name="solidFgAcc1">
+    <dgm:scene3d>
+      <a:camera prst="orthographicFront"/>
+      <a:lightRig rig="threePt" dir="t">
+        <a:rot lat="0" lon="0" rev="7500000"/>
+      </a:lightRig>
+    </dgm:scene3d>
+    <dgm:sp3d z="152400" extrusionH="63500" prstMaterial="dkEdge">
+      <a:bevelT w="120800" h="19050" prst="relaxedInset"/>
+      <a:contourClr>
+        <a:schemeClr val="bg1"/>
+      </a:contourClr>
+    </dgm:sp3d>
+    <dgm:txPr/>
+    <dgm:style>
+      <a:lnRef idx="1">
+        <a:scrgbClr r="0" g="0" b="0"/>
+      </a:lnRef>
+      <a:fillRef idx="1">
+        <a:scrgbClr r="0" g="0" b="0"/>
+      </a:fillRef>
+      <a:effectRef idx="2">
+        <a:scrgbClr r="0" g="0" b="0"/>
+      </a:effectRef>
+      <a:fontRef idx="minor"/>
+    </dgm:style>
+  </dgm:styleLbl>
+  <dgm:styleLbl name="solidAlignAcc1">
+    <dgm:scene3d>
+      <a:camera prst="orthographicFront"/>
+      <a:lightRig rig="threePt" dir="t">
+        <a:rot lat="0" lon="0" rev="7500000"/>
+      </a:lightRig>
+    </dgm:scene3d>
+    <dgm:sp3d extrusionH="190500" prstMaterial="dkEdge">
+      <a:bevelT w="120650" h="38100" prst="relaxedInset"/>
+      <a:contourClr>
+        <a:schemeClr val="bg1"/>
+      </a:contourClr>
+    </dgm:sp3d>
+    <dgm:txPr/>
+    <dgm:style>
+      <a:lnRef idx="1">
+        <a:scrgbClr r="0" g="0" b="0"/>
+      </a:lnRef>
+      <a:fillRef idx="1">
+        <a:scrgbClr r="0" g="0" b="0"/>
+      </a:fillRef>
+      <a:effectRef idx="2">
+        <a:scrgbClr r="0" g="0" b="0"/>
+      </a:effectRef>
+      <a:fontRef idx="minor"/>
+    </dgm:style>
+  </dgm:styleLbl>
+  <dgm:styleLbl name="solidBgAcc1">
+    <dgm:scene3d>
+      <a:camera prst="orthographicFront"/>
+      <a:lightRig rig="threePt" dir="t">
+        <a:rot lat="0" lon="0" rev="7500000"/>
+      </a:lightRig>
+    </dgm:scene3d>
+    <dgm:sp3d z="-152400" extrusionH="63500" prstMaterial="dkEdge">
+      <a:bevelT w="144450" h="36350" prst="relaxedInset"/>
+      <a:contourClr>
+        <a:schemeClr val="bg1"/>
+      </a:contourClr>
+    </dgm:sp3d>
+    <dgm:txPr/>
+    <dgm:style>
+      <a:lnRef idx="1">
+        <a:scrgbClr r="0" g="0" b="0"/>
+      </a:lnRef>
+      <a:fillRef idx="1">
+        <a:scrgbClr r="0" g="0" b="0"/>
+      </a:fillRef>
+      <a:effectRef idx="0">
+        <a:scrgbClr r="0" g="0" b="0"/>
+      </a:effectRef>
+      <a:fontRef idx="minor"/>
+    </dgm:style>
+  </dgm:styleLbl>
+  <dgm:styleLbl name="fgAccFollowNode1">
+    <dgm:scene3d>
+      <a:camera prst="orthographicFront"/>
+      <a:lightRig rig="threePt" dir="t">
+        <a:rot lat="0" lon="0" rev="7500000"/>
+      </a:lightRig>
+    </dgm:scene3d>
+    <dgm:sp3d z="152400" extrusionH="63500" prstMaterial="dkEdge">
+      <a:bevelT w="125400" h="36350" prst="relaxedInset"/>
+      <a:contourClr>
+        <a:schemeClr val="bg1"/>
+      </a:contourClr>
+    </dgm:sp3d>
+    <dgm:txPr/>
+    <dgm:style>
+      <a:lnRef idx="1">
+        <a:scrgbClr r="0" g="0" b="0"/>
+      </a:lnRef>
+      <a:fillRef idx="1">
+        <a:scrgbClr r="0" g="0" b="0"/>
+      </a:fillRef>
+      <a:effectRef idx="0">
+        <a:scrgbClr r="0" g="0" b="0"/>
+      </a:effectRef>
+      <a:fontRef idx="minor"/>
+    </dgm:style>
+  </dgm:styleLbl>
+  <dgm:styleLbl name="alignAccFollowNode1">
+    <dgm:scene3d>
+      <a:camera prst="orthographicFront"/>
+      <a:lightRig rig="threePt" dir="t">
+        <a:rot lat="0" lon="0" rev="7500000"/>
+      </a:lightRig>
+    </dgm:scene3d>
+    <dgm:sp3d extrusionH="190500" prstMaterial="dkEdge">
+      <a:bevelT w="120650" h="38100" prst="relaxedInset"/>
+      <a:bevelB w="120650" h="57150" prst="relaxedInset"/>
+      <a:contourClr>
+        <a:schemeClr val="bg1"/>
+      </a:contourClr>
+    </dgm:sp3d>
+    <dgm:txPr/>
+    <dgm:style>
+      <a:lnRef idx="1">
+        <a:scrgbClr r="0" g="0" b="0"/>
+      </a:lnRef>
+      <a:fillRef idx="1">
+        <a:scrgbClr r="0" g="0" b="0"/>
+      </a:fillRef>
+      <a:effectRef idx="2">
+        <a:scrgbClr r="0" g="0" b="0"/>
+      </a:effectRef>
+      <a:fontRef idx="minor"/>
+    </dgm:style>
+  </dgm:styleLbl>
+  <dgm:styleLbl name="bgAccFollowNode1">
+    <dgm:scene3d>
+      <a:camera prst="orthographicFront"/>
+      <a:lightRig rig="threePt" dir="t">
+        <a:rot lat="0" lon="0" rev="7500000"/>
+      </a:lightRig>
+    </dgm:scene3d>
+    <dgm:sp3d z="-152400" extrusionH="63500" prstMaterial="dkEdge">
+      <a:bevelT w="144450" h="36350" prst="relaxedInset"/>
+      <a:contourClr>
+        <a:schemeClr val="bg1"/>
+      </a:contourClr>
+    </dgm:sp3d>
+    <dgm:txPr/>
+    <dgm:style>
+      <a:lnRef idx="1">
+        <a:scrgbClr r="0" g="0" b="0"/>
+      </a:lnRef>
+      <a:fillRef idx="1">
+        <a:scrgbClr r="0" g="0" b="0"/>
+      </a:fillRef>
+      <a:effectRef idx="2">
+        <a:scrgbClr r="0" g="0" b="0"/>
+      </a:effectRef>
+      <a:fontRef idx="minor"/>
+    </dgm:style>
+  </dgm:styleLbl>
+  <dgm:styleLbl name="fgAcc0">
+    <dgm:scene3d>
+      <a:camera prst="orthographicFront"/>
+      <a:lightRig rig="threePt" dir="t">
+        <a:rot lat="0" lon="0" rev="7500000"/>
+      </a:lightRig>
+    </dgm:scene3d>
+    <dgm:sp3d z="152400" extrusionH="63500" prstMaterial="dkEdge">
+      <a:bevelT w="125400" h="36350" prst="relaxedInset"/>
+      <a:contourClr>
+        <a:schemeClr val="bg1"/>
+      </a:contourClr>
+    </dgm:sp3d>
+    <dgm:txPr/>
+    <dgm:style>
+      <a:lnRef idx="1">
+        <a:scrgbClr r="0" g="0" b="0"/>
+      </a:lnRef>
+      <a:fillRef idx="1">
+        <a:scrgbClr r="0" g="0" b="0"/>
+      </a:fillRef>
+      <a:effectRef idx="2">
+        <a:scrgbClr r="0" g="0" b="0"/>
+      </a:effectRef>
+      <a:fontRef idx="minor"/>
+    </dgm:style>
+  </dgm:styleLbl>
+  <dgm:styleLbl name="fgAcc2">
+    <dgm:scene3d>
+      <a:camera prst="orthographicFront"/>
+      <a:lightRig rig="threePt" dir="t">
+        <a:rot lat="0" lon="0" rev="7500000"/>
+      </a:lightRig>
+    </dgm:scene3d>
+    <dgm:sp3d z="152400" extrusionH="63500" prstMaterial="dkEdge">
+      <a:bevelT w="125400" h="36350" prst="relaxedInset"/>
+      <a:contourClr>
+        <a:schemeClr val="bg1"/>
+      </a:contourClr>
+    </dgm:sp3d>
+    <dgm:txPr/>
+    <dgm:style>
+      <a:lnRef idx="1">
+        <a:scrgbClr r="0" g="0" b="0"/>
+      </a:lnRef>
+      <a:fillRef idx="1">
+        <a:scrgbClr r="0" g="0" b="0"/>
+      </a:fillRef>
+      <a:effectRef idx="2">
+        <a:scrgbClr r="0" g="0" b="0"/>
+      </a:effectRef>
+      <a:fontRef idx="minor"/>
+    </dgm:style>
+  </dgm:styleLbl>
+  <dgm:styleLbl name="fgAcc3">
+    <dgm:scene3d>
+      <a:camera prst="orthographicFront"/>
+      <a:lightRig rig="threePt" dir="t">
+        <a:rot lat="0" lon="0" rev="7500000"/>
+      </a:lightRig>
+    </dgm:scene3d>
+    <dgm:sp3d z="152400" extrusionH="63500" prstMaterial="dkEdge">
+      <a:bevelT w="125400" h="36350" prst="relaxedInset"/>
+      <a:contourClr>
+        <a:schemeClr val="bg1"/>
+      </a:contourClr>
+    </dgm:sp3d>
+    <dgm:txPr/>
+    <dgm:style>
+      <a:lnRef idx="1">
+        <a:scrgbClr r="0" g="0" b="0"/>
+      </a:lnRef>
+      <a:fillRef idx="1">
+        <a:scrgbClr r="0" g="0" b="0"/>
+      </a:fillRef>
+      <a:effectRef idx="2">
+        <a:scrgbClr r="0" g="0" b="0"/>
+      </a:effectRef>
+      <a:fontRef idx="minor"/>
+    </dgm:style>
+  </dgm:styleLbl>
+  <dgm:styleLbl name="fgAcc4">
+    <dgm:scene3d>
+      <a:camera prst="orthographicFront"/>
+      <a:lightRig rig="threePt" dir="t">
+        <a:rot lat="0" lon="0" rev="7500000"/>
+      </a:lightRig>
+    </dgm:scene3d>
+    <dgm:sp3d z="152400" extrusionH="63500" prstMaterial="dkEdge">
+      <a:bevelT w="125400" h="36350" prst="relaxedInset"/>
+      <a:contourClr>
+        <a:schemeClr val="bg1"/>
+      </a:contourClr>
+    </dgm:sp3d>
+    <dgm:txPr/>
+    <dgm:style>
+      <a:lnRef idx="1">
+        <a:scrgbClr r="0" g="0" b="0"/>
+      </a:lnRef>
+      <a:fillRef idx="1">
+        <a:scrgbClr r="0" g="0" b="0"/>
+      </a:fillRef>
+      <a:effectRef idx="2">
+        <a:scrgbClr r="0" g="0" b="0"/>
+      </a:effectRef>
+      <a:fontRef idx="minor"/>
+    </dgm:style>
+  </dgm:styleLbl>
+  <dgm:styleLbl name="bgShp">
+    <dgm:scene3d>
+      <a:camera prst="orthographicFront"/>
+      <a:lightRig rig="threePt" dir="t">
+        <a:rot lat="0" lon="0" rev="7500000"/>
+      </a:lightRig>
+    </dgm:scene3d>
+    <dgm:sp3d z="-152400" extrusionH="63500" prstMaterial="matte">
+      <a:bevelT w="144450" h="6350" prst="relaxedInset"/>
+      <a:contourClr>
+        <a:schemeClr val="bg1"/>
+      </a:contourClr>
+    </dgm:sp3d>
+    <dgm:txPr/>
+    <dgm:style>
+      <a:lnRef idx="0">
+        <a:scrgbClr r="0" g="0" b="0"/>
+      </a:lnRef>
+      <a:fillRef idx="3">
+        <a:scrgbClr r="0" g="0" b="0"/>
+      </a:fillRef>
+      <a:effectRef idx="0">
+        <a:scrgbClr r="0" g="0" b="0"/>
+      </a:effectRef>
+      <a:fontRef idx="minor"/>
+    </dgm:style>
+  </dgm:styleLbl>
+  <dgm:styleLbl name="dkBgShp">
+    <dgm:scene3d>
+      <a:camera prst="orthographicFront"/>
+      <a:lightRig rig="threePt" dir="t">
+        <a:rot lat="0" lon="0" rev="7500000"/>
+      </a:lightRig>
+    </dgm:scene3d>
+    <dgm:sp3d prstMaterial="plastic">
+      <a:bevelT w="127000" h="25400" prst="relaxedInset"/>
+      <a:bevelB w="88900" h="121750" prst="angle"/>
+    </dgm:sp3d>
+    <dgm:txPr/>
+    <dgm:style>
+      <a:lnRef idx="0">
+        <a:scrgbClr r="0" g="0" b="0"/>
+      </a:lnRef>
+      <a:fillRef idx="1">
+        <a:scrgbClr r="0" g="0" b="0"/>
+      </a:fillRef>
+      <a:effectRef idx="2">
+        <a:scrgbClr r="0" g="0" b="0"/>
+      </a:effectRef>
+      <a:fontRef idx="minor">
+        <a:schemeClr val="lt1"/>
+      </a:fontRef>
+    </dgm:style>
+  </dgm:styleLbl>
+  <dgm:styleLbl name="trBgShp">
+    <dgm:scene3d>
+      <a:camera prst="orthographicFront"/>
+      <a:lightRig rig="threePt" dir="t"/>
+    </dgm:scene3d>
+    <dgm:sp3d z="-152400" prstMaterial="matte"/>
+    <dgm:txPr/>
+    <dgm:style>
+      <a:lnRef idx="0">
+        <a:scrgbClr r="0" g="0" b="0"/>
+      </a:lnRef>
+      <a:fillRef idx="1">
+        <a:scrgbClr r="0" g="0" b="0"/>
+      </a:fillRef>
+      <a:effectRef idx="0">
+        <a:scrgbClr r="0" g="0" b="0"/>
+      </a:effectRef>
+      <a:fontRef idx="minor"/>
+    </dgm:style>
+  </dgm:styleLbl>
+  <dgm:styleLbl name="fgShp">
+    <dgm:scene3d>
+      <a:camera prst="orthographicFront"/>
+      <a:lightRig rig="threePt" dir="t">
+        <a:rot lat="0" lon="0" rev="7500000"/>
+      </a:lightRig>
+    </dgm:scene3d>
+    <dgm:sp3d z="152400" extrusionH="63500" prstMaterial="matte">
+      <a:bevelT w="50800" h="19050" prst="relaxedInset"/>
+      <a:contourClr>
+        <a:schemeClr val="bg1"/>
+      </a:contourClr>
+    </dgm:sp3d>
+    <dgm:txPr/>
+    <dgm:style>
+      <a:lnRef idx="0">
+        <a:scrgbClr r="0" g="0" b="0"/>
+      </a:lnRef>
+      <a:fillRef idx="1">
+        <a:scrgbClr r="0" g="0" b="0"/>
+      </a:fillRef>
+      <a:effectRef idx="2">
+        <a:scrgbClr r="0" g="0" b="0"/>
+      </a:effectRef>
+      <a:fontRef idx="minor">
+        <a:schemeClr val="lt1"/>
+      </a:fontRef>
+    </dgm:style>
+  </dgm:styleLbl>
+  <dgm:styleLbl name="revTx">
+    <dgm:scene3d>
+      <a:camera prst="orthographicFront"/>
+      <a:lightRig rig="threePt" dir="t"/>
+    </dgm:scene3d>
+    <dgm:sp3d/>
+    <dgm:txPr/>
+    <dgm:style>
+      <a:lnRef idx="0">
+        <a:scrgbClr r="0" g="0" b="0"/>
+      </a:lnRef>
+      <a:fillRef idx="0">
+        <a:scrgbClr r="0" g="0" b="0"/>
+      </a:fillRef>
+      <a:effectRef idx="0">
+        <a:scrgbClr r="0" g="0" b="0"/>
+      </a:effectRef>
+      <a:fontRef idx="minor"/>
+    </dgm:style>
+  </dgm:styleLbl>
+</dgm:styleDef>
 </file>
 
 <file path=ppt/slideLayouts/slideLayout1.xml><?xml version="1.0" encoding="utf-8"?>
@@ -5707,6 +9456,107 @@
 </p:sld>
 </file>
 
+<file path=ppt/slides/slide3.xml><?xml version="1.0" encoding="utf-8"?>
+<p:sld xmlns:a="http://schemas.openxmlformats.org/drawingml/2006/main" xmlns:r="http://schemas.openxmlformats.org/officeDocument/2006/relationships" xmlns:p="http://schemas.openxmlformats.org/presentationml/2006/main">
+  <p:cSld>
+    <p:spTree>
+      <p:nvGrpSpPr>
+        <p:cNvPr id="1" name=""/>
+        <p:cNvGrpSpPr/>
+        <p:nvPr/>
+      </p:nvGrpSpPr>
+      <p:grpSpPr>
+        <a:xfrm>
+          <a:off x="0" y="0"/>
+          <a:ext cx="0" cy="0"/>
+          <a:chOff x="0" y="0"/>
+          <a:chExt cx="0" cy="0"/>
+        </a:xfrm>
+      </p:grpSpPr>
+      <p:sp>
+        <p:nvSpPr>
+          <p:cNvPr id="2" name="Título 1">
+            <a:extLst>
+              <a:ext uri="{FF2B5EF4-FFF2-40B4-BE49-F238E27FC236}">
+                <a16:creationId xmlns:a16="http://schemas.microsoft.com/office/drawing/2014/main" id="{D43CAE2C-076D-4B5B-89C5-103FDC8DACC1}"/>
+              </a:ext>
+            </a:extLst>
+          </p:cNvPr>
+          <p:cNvSpPr>
+            <a:spLocks noGrp="1"/>
+          </p:cNvSpPr>
+          <p:nvPr>
+            <p:ph type="title"/>
+          </p:nvPr>
+        </p:nvSpPr>
+        <p:spPr>
+          <a:xfrm>
+            <a:off x="516230" y="624626"/>
+            <a:ext cx="3849708" cy="1809482"/>
+          </a:xfrm>
+        </p:spPr>
+        <p:txBody>
+          <a:bodyPr>
+            <a:normAutofit/>
+          </a:bodyPr>
+          <a:lstStyle/>
+          <a:p>
+            <a:r>
+              <a:rPr lang="es-MX" sz="4800" b="1" dirty="0">
+                <a:effectLst>
+                  <a:outerShdw blurRad="38100" dist="38100" dir="2700000" algn="tl">
+                    <a:srgbClr val="000000">
+                      <a:alpha val="43137"/>
+                    </a:srgbClr>
+                  </a:outerShdw>
+                </a:effectLst>
+              </a:rPr>
+              <a:t>Orden de comandos</a:t>
+            </a:r>
+          </a:p>
+        </p:txBody>
+      </p:sp>
+      <p:graphicFrame>
+        <p:nvGraphicFramePr>
+          <p:cNvPr id="4" name="Diagrama 3">
+            <a:extLst>
+              <a:ext uri="{FF2B5EF4-FFF2-40B4-BE49-F238E27FC236}">
+                <a16:creationId xmlns:a16="http://schemas.microsoft.com/office/drawing/2014/main" id="{B9DD371A-2706-461E-8F8E-3C5324857D4B}"/>
+              </a:ext>
+            </a:extLst>
+          </p:cNvPr>
+          <p:cNvGraphicFramePr/>
+          <p:nvPr>
+            <p:extLst>
+              <p:ext uri="{D42A27DB-BD31-4B8C-83A1-F6EECF244321}">
+                <p14:modId xmlns:p14="http://schemas.microsoft.com/office/powerpoint/2010/main" val="3541413913"/>
+              </p:ext>
+            </p:extLst>
+          </p:nvPr>
+        </p:nvGraphicFramePr>
+        <p:xfrm>
+          <a:off x="2031999" y="410574"/>
+          <a:ext cx="9643771" cy="5835680"/>
+        </p:xfrm>
+        <a:graphic>
+          <a:graphicData uri="http://schemas.openxmlformats.org/drawingml/2006/diagram">
+            <dgm:relIds xmlns:dgm="http://schemas.openxmlformats.org/drawingml/2006/diagram" xmlns:r="http://schemas.openxmlformats.org/officeDocument/2006/relationships" r:dm="rId2" r:lo="rId3" r:qs="rId4" r:cs="rId5"/>
+          </a:graphicData>
+        </a:graphic>
+      </p:graphicFrame>
+    </p:spTree>
+    <p:extLst>
+      <p:ext uri="{BB962C8B-B14F-4D97-AF65-F5344CB8AC3E}">
+        <p14:creationId xmlns:p14="http://schemas.microsoft.com/office/powerpoint/2010/main" val="324491642"/>
+      </p:ext>
+    </p:extLst>
+  </p:cSld>
+  <p:clrMapOvr>
+    <a:masterClrMapping/>
+  </p:clrMapOvr>
+</p:sld>
+</file>
+
 <file path=ppt/theme/theme1.xml><?xml version="1.0" encoding="utf-8"?>
 <a:theme xmlns:a="http://schemas.openxmlformats.org/drawingml/2006/main" name="Office Theme">
   <a:themeElements>

</xml_diff>